<commit_message>
Fixed demo for hand_gesture_recognition
</commit_message>
<xml_diff>
--- a/docs/Computer Vision Project Presentation.pptx
+++ b/docs/Computer Vision Project Presentation.pptx
@@ -5,34 +5,33 @@
     <p:sldMasterId id="2147483659" r:id="rId1"/>
   </p:sldMasterIdLst>
   <p:notesMasterIdLst>
-    <p:notesMasterId r:id="rId17"/>
+    <p:notesMasterId r:id="rId16"/>
   </p:notesMasterIdLst>
   <p:sldIdLst>
     <p:sldId id="256" r:id="rId2"/>
     <p:sldId id="257" r:id="rId3"/>
     <p:sldId id="258" r:id="rId4"/>
-    <p:sldId id="259" r:id="rId5"/>
-    <p:sldId id="260" r:id="rId6"/>
-    <p:sldId id="261" r:id="rId7"/>
-    <p:sldId id="262" r:id="rId8"/>
-    <p:sldId id="263" r:id="rId9"/>
-    <p:sldId id="264" r:id="rId10"/>
-    <p:sldId id="265" r:id="rId11"/>
-    <p:sldId id="266" r:id="rId12"/>
-    <p:sldId id="267" r:id="rId13"/>
-    <p:sldId id="268" r:id="rId14"/>
-    <p:sldId id="269" r:id="rId15"/>
-    <p:sldId id="270" r:id="rId16"/>
+    <p:sldId id="260" r:id="rId5"/>
+    <p:sldId id="261" r:id="rId6"/>
+    <p:sldId id="262" r:id="rId7"/>
+    <p:sldId id="263" r:id="rId8"/>
+    <p:sldId id="264" r:id="rId9"/>
+    <p:sldId id="265" r:id="rId10"/>
+    <p:sldId id="266" r:id="rId11"/>
+    <p:sldId id="267" r:id="rId12"/>
+    <p:sldId id="268" r:id="rId13"/>
+    <p:sldId id="269" r:id="rId14"/>
+    <p:sldId id="270" r:id="rId15"/>
   </p:sldIdLst>
   <p:sldSz cx="9144000" cy="5143500" type="screen16x9"/>
   <p:notesSz cx="6858000" cy="9144000"/>
   <p:embeddedFontLst>
     <p:embeddedFont>
       <p:font typeface="Roboto" panose="02000000000000000000" pitchFamily="2" charset="0"/>
-      <p:regular r:id="rId18"/>
-      <p:bold r:id="rId19"/>
-      <p:italic r:id="rId20"/>
-      <p:boldItalic r:id="rId21"/>
+      <p:regular r:id="rId17"/>
+      <p:bold r:id="rId18"/>
+      <p:italic r:id="rId19"/>
+      <p:boldItalic r:id="rId20"/>
     </p:embeddedFont>
   </p:embeddedFontLst>
   <p:defaultTextStyle>
@@ -833,110 +832,6 @@
   <p:cSld>
     <p:spTree>
       <p:nvGrpSpPr>
-        <p:cNvPr id="1" name="Shape 159"/>
-        <p:cNvGrpSpPr/>
-        <p:nvPr/>
-      </p:nvGrpSpPr>
-      <p:grpSpPr>
-        <a:xfrm>
-          <a:off x="0" y="0"/>
-          <a:ext cx="0" cy="0"/>
-          <a:chOff x="0" y="0"/>
-          <a:chExt cx="0" cy="0"/>
-        </a:xfrm>
-      </p:grpSpPr>
-      <p:sp>
-        <p:nvSpPr>
-          <p:cNvPr id="160" name="Google Shape;160;g22f7837bed4_0_15:notes"/>
-          <p:cNvSpPr>
-            <a:spLocks noGrp="1" noRot="1" noChangeAspect="1"/>
-          </p:cNvSpPr>
-          <p:nvPr>
-            <p:ph type="sldImg" idx="2"/>
-          </p:nvPr>
-        </p:nvSpPr>
-        <p:spPr>
-          <a:xfrm>
-            <a:off x="381300" y="685800"/>
-            <a:ext cx="6096000" cy="3429000"/>
-          </a:xfrm>
-          <a:custGeom>
-            <a:avLst/>
-            <a:gdLst/>
-            <a:ahLst/>
-            <a:cxnLst/>
-            <a:rect l="l" t="t" r="r" b="b"/>
-            <a:pathLst>
-              <a:path w="120000" h="120000" extrusionOk="0">
-                <a:moveTo>
-                  <a:pt x="0" y="0"/>
-                </a:moveTo>
-                <a:lnTo>
-                  <a:pt x="120000" y="0"/>
-                </a:lnTo>
-                <a:lnTo>
-                  <a:pt x="120000" y="120000"/>
-                </a:lnTo>
-                <a:lnTo>
-                  <a:pt x="0" y="120000"/>
-                </a:lnTo>
-                <a:close/>
-              </a:path>
-            </a:pathLst>
-          </a:custGeom>
-        </p:spPr>
-      </p:sp>
-      <p:sp>
-        <p:nvSpPr>
-          <p:cNvPr id="161" name="Google Shape;161;g22f7837bed4_0_15:notes"/>
-          <p:cNvSpPr txBox="1">
-            <a:spLocks noGrp="1"/>
-          </p:cNvSpPr>
-          <p:nvPr>
-            <p:ph type="body" idx="1"/>
-          </p:nvPr>
-        </p:nvSpPr>
-        <p:spPr>
-          <a:xfrm>
-            <a:off x="685800" y="4343400"/>
-            <a:ext cx="5486400" cy="4114800"/>
-          </a:xfrm>
-          <a:prstGeom prst="rect">
-            <a:avLst/>
-          </a:prstGeom>
-        </p:spPr>
-        <p:txBody>
-          <a:bodyPr spcFirstLastPara="1" wrap="square" lIns="91425" tIns="91425" rIns="91425" bIns="91425" anchor="t" anchorCtr="0">
-            <a:noAutofit/>
-          </a:bodyPr>
-          <a:lstStyle/>
-          <a:p>
-            <a:pPr marL="0" lvl="0" indent="0" algn="l" rtl="0">
-              <a:spcBef>
-                <a:spcPts val="0"/>
-              </a:spcBef>
-              <a:spcAft>
-                <a:spcPts val="0"/>
-              </a:spcAft>
-              <a:buNone/>
-            </a:pPr>
-            <a:endParaRPr/>
-          </a:p>
-        </p:txBody>
-      </p:sp>
-    </p:spTree>
-  </p:cSld>
-  <p:clrMapOvr>
-    <a:masterClrMapping/>
-  </p:clrMapOvr>
-</p:notes>
-</file>
-
-<file path=ppt/notesSlides/notesSlide11.xml><?xml version="1.0" encoding="utf-8"?>
-<p:notes xmlns:a="http://schemas.openxmlformats.org/drawingml/2006/main" xmlns:r="http://schemas.openxmlformats.org/officeDocument/2006/relationships" xmlns:p="http://schemas.openxmlformats.org/presentationml/2006/main" showMasterSp="0" showMasterPhAnim="0">
-  <p:cSld>
-    <p:spTree>
-      <p:nvGrpSpPr>
         <p:cNvPr id="1" name="Shape 179"/>
         <p:cNvGrpSpPr/>
         <p:nvPr/>
@@ -1036,7 +931,7 @@
 </p:notes>
 </file>
 
-<file path=ppt/notesSlides/notesSlide12.xml><?xml version="1.0" encoding="utf-8"?>
+<file path=ppt/notesSlides/notesSlide11.xml><?xml version="1.0" encoding="utf-8"?>
 <p:notes xmlns:a="http://schemas.openxmlformats.org/drawingml/2006/main" xmlns:r="http://schemas.openxmlformats.org/officeDocument/2006/relationships" xmlns:p="http://schemas.openxmlformats.org/presentationml/2006/main" showMasterSp="0" showMasterPhAnim="0">
   <p:cSld>
     <p:spTree>
@@ -1140,7 +1035,7 @@
 </p:notes>
 </file>
 
-<file path=ppt/notesSlides/notesSlide13.xml><?xml version="1.0" encoding="utf-8"?>
+<file path=ppt/notesSlides/notesSlide12.xml><?xml version="1.0" encoding="utf-8"?>
 <p:notes xmlns:a="http://schemas.openxmlformats.org/drawingml/2006/main" xmlns:r="http://schemas.openxmlformats.org/officeDocument/2006/relationships" xmlns:p="http://schemas.openxmlformats.org/presentationml/2006/main" showMasterSp="0" showMasterPhAnim="0">
   <p:cSld>
     <p:spTree>
@@ -1244,7 +1139,7 @@
 </p:notes>
 </file>
 
-<file path=ppt/notesSlides/notesSlide14.xml><?xml version="1.0" encoding="utf-8"?>
+<file path=ppt/notesSlides/notesSlide13.xml><?xml version="1.0" encoding="utf-8"?>
 <p:notes xmlns:a="http://schemas.openxmlformats.org/drawingml/2006/main" xmlns:r="http://schemas.openxmlformats.org/officeDocument/2006/relationships" xmlns:p="http://schemas.openxmlformats.org/presentationml/2006/main" showMasterSp="0" showMasterPhAnim="0">
   <p:cSld>
     <p:spTree>
@@ -1348,7 +1243,7 @@
 </p:notes>
 </file>
 
-<file path=ppt/notesSlides/notesSlide15.xml><?xml version="1.0" encoding="utf-8"?>
+<file path=ppt/notesSlides/notesSlide14.xml><?xml version="1.0" encoding="utf-8"?>
 <p:notes xmlns:a="http://schemas.openxmlformats.org/drawingml/2006/main" xmlns:r="http://schemas.openxmlformats.org/officeDocument/2006/relationships" xmlns:p="http://schemas.openxmlformats.org/presentationml/2006/main" showMasterSp="0" showMasterPhAnim="0">
   <p:cSld>
     <p:spTree>
@@ -1665,110 +1560,6 @@
   <p:cSld>
     <p:spTree>
       <p:nvGrpSpPr>
-        <p:cNvPr id="1" name="Shape 100"/>
-        <p:cNvGrpSpPr/>
-        <p:nvPr/>
-      </p:nvGrpSpPr>
-      <p:grpSpPr>
-        <a:xfrm>
-          <a:off x="0" y="0"/>
-          <a:ext cx="0" cy="0"/>
-          <a:chOff x="0" y="0"/>
-          <a:chExt cx="0" cy="0"/>
-        </a:xfrm>
-      </p:grpSpPr>
-      <p:sp>
-        <p:nvSpPr>
-          <p:cNvPr id="101" name="Google Shape;101;gc6f9e470d_0_24:notes"/>
-          <p:cNvSpPr>
-            <a:spLocks noGrp="1" noRot="1" noChangeAspect="1"/>
-          </p:cNvSpPr>
-          <p:nvPr>
-            <p:ph type="sldImg" idx="2"/>
-          </p:nvPr>
-        </p:nvSpPr>
-        <p:spPr>
-          <a:xfrm>
-            <a:off x="381188" y="685800"/>
-            <a:ext cx="6096300" cy="3429000"/>
-          </a:xfrm>
-          <a:custGeom>
-            <a:avLst/>
-            <a:gdLst/>
-            <a:ahLst/>
-            <a:cxnLst/>
-            <a:rect l="l" t="t" r="r" b="b"/>
-            <a:pathLst>
-              <a:path w="120000" h="120000" extrusionOk="0">
-                <a:moveTo>
-                  <a:pt x="0" y="0"/>
-                </a:moveTo>
-                <a:lnTo>
-                  <a:pt x="120000" y="0"/>
-                </a:lnTo>
-                <a:lnTo>
-                  <a:pt x="120000" y="120000"/>
-                </a:lnTo>
-                <a:lnTo>
-                  <a:pt x="0" y="120000"/>
-                </a:lnTo>
-                <a:close/>
-              </a:path>
-            </a:pathLst>
-          </a:custGeom>
-        </p:spPr>
-      </p:sp>
-      <p:sp>
-        <p:nvSpPr>
-          <p:cNvPr id="102" name="Google Shape;102;gc6f9e470d_0_24:notes"/>
-          <p:cNvSpPr txBox="1">
-            <a:spLocks noGrp="1"/>
-          </p:cNvSpPr>
-          <p:nvPr>
-            <p:ph type="body" idx="1"/>
-          </p:nvPr>
-        </p:nvSpPr>
-        <p:spPr>
-          <a:xfrm>
-            <a:off x="685800" y="4343400"/>
-            <a:ext cx="5486400" cy="4114800"/>
-          </a:xfrm>
-          <a:prstGeom prst="rect">
-            <a:avLst/>
-          </a:prstGeom>
-        </p:spPr>
-        <p:txBody>
-          <a:bodyPr spcFirstLastPara="1" wrap="square" lIns="91425" tIns="91425" rIns="91425" bIns="91425" anchor="t" anchorCtr="0">
-            <a:noAutofit/>
-          </a:bodyPr>
-          <a:lstStyle/>
-          <a:p>
-            <a:pPr marL="0" lvl="0" indent="0" algn="l" rtl="0">
-              <a:spcBef>
-                <a:spcPts val="0"/>
-              </a:spcBef>
-              <a:spcAft>
-                <a:spcPts val="0"/>
-              </a:spcAft>
-              <a:buNone/>
-            </a:pPr>
-            <a:endParaRPr/>
-          </a:p>
-        </p:txBody>
-      </p:sp>
-    </p:spTree>
-  </p:cSld>
-  <p:clrMapOvr>
-    <a:masterClrMapping/>
-  </p:clrMapOvr>
-</p:notes>
-</file>
-
-<file path=ppt/notesSlides/notesSlide5.xml><?xml version="1.0" encoding="utf-8"?>
-<p:notes xmlns:a="http://schemas.openxmlformats.org/drawingml/2006/main" xmlns:r="http://schemas.openxmlformats.org/officeDocument/2006/relationships" xmlns:p="http://schemas.openxmlformats.org/presentationml/2006/main" showMasterSp="0" showMasterPhAnim="0">
-  <p:cSld>
-    <p:spTree>
-      <p:nvGrpSpPr>
         <p:cNvPr id="1" name="Shape 115"/>
         <p:cNvGrpSpPr/>
         <p:nvPr/>
@@ -1868,7 +1659,7 @@
 </p:notes>
 </file>
 
-<file path=ppt/notesSlides/notesSlide6.xml><?xml version="1.0" encoding="utf-8"?>
+<file path=ppt/notesSlides/notesSlide5.xml><?xml version="1.0" encoding="utf-8"?>
 <p:notes xmlns:a="http://schemas.openxmlformats.org/drawingml/2006/main" xmlns:r="http://schemas.openxmlformats.org/officeDocument/2006/relationships" xmlns:p="http://schemas.openxmlformats.org/presentationml/2006/main" showMasterSp="0" showMasterPhAnim="0">
   <p:cSld>
     <p:spTree>
@@ -1972,7 +1763,7 @@
 </p:notes>
 </file>
 
-<file path=ppt/notesSlides/notesSlide7.xml><?xml version="1.0" encoding="utf-8"?>
+<file path=ppt/notesSlides/notesSlide6.xml><?xml version="1.0" encoding="utf-8"?>
 <p:notes xmlns:a="http://schemas.openxmlformats.org/drawingml/2006/main" xmlns:r="http://schemas.openxmlformats.org/officeDocument/2006/relationships" xmlns:p="http://schemas.openxmlformats.org/presentationml/2006/main" showMasterSp="0" showMasterPhAnim="0">
   <p:cSld>
     <p:spTree>
@@ -2076,7 +1867,7 @@
 </p:notes>
 </file>
 
-<file path=ppt/notesSlides/notesSlide8.xml><?xml version="1.0" encoding="utf-8"?>
+<file path=ppt/notesSlides/notesSlide7.xml><?xml version="1.0" encoding="utf-8"?>
 <p:notes xmlns:a="http://schemas.openxmlformats.org/drawingml/2006/main" xmlns:r="http://schemas.openxmlformats.org/officeDocument/2006/relationships" xmlns:p="http://schemas.openxmlformats.org/presentationml/2006/main" showMasterSp="0" showMasterPhAnim="0">
   <p:cSld>
     <p:spTree>
@@ -2180,7 +1971,7 @@
 </p:notes>
 </file>
 
-<file path=ppt/notesSlides/notesSlide9.xml><?xml version="1.0" encoding="utf-8"?>
+<file path=ppt/notesSlides/notesSlide8.xml><?xml version="1.0" encoding="utf-8"?>
 <p:notes xmlns:a="http://schemas.openxmlformats.org/drawingml/2006/main" xmlns:r="http://schemas.openxmlformats.org/officeDocument/2006/relationships" xmlns:p="http://schemas.openxmlformats.org/presentationml/2006/main" showMasterSp="0" showMasterPhAnim="0">
   <p:cSld>
     <p:spTree>
@@ -2241,6 +2032,110 @@
       <p:sp>
         <p:nvSpPr>
           <p:cNvPr id="156" name="Google Shape;156;gc6f9e470d_0_43:notes"/>
+          <p:cNvSpPr txBox="1">
+            <a:spLocks noGrp="1"/>
+          </p:cNvSpPr>
+          <p:nvPr>
+            <p:ph type="body" idx="1"/>
+          </p:nvPr>
+        </p:nvSpPr>
+        <p:spPr>
+          <a:xfrm>
+            <a:off x="685800" y="4343400"/>
+            <a:ext cx="5486400" cy="4114800"/>
+          </a:xfrm>
+          <a:prstGeom prst="rect">
+            <a:avLst/>
+          </a:prstGeom>
+        </p:spPr>
+        <p:txBody>
+          <a:bodyPr spcFirstLastPara="1" wrap="square" lIns="91425" tIns="91425" rIns="91425" bIns="91425" anchor="t" anchorCtr="0">
+            <a:noAutofit/>
+          </a:bodyPr>
+          <a:lstStyle/>
+          <a:p>
+            <a:pPr marL="0" lvl="0" indent="0" algn="l" rtl="0">
+              <a:spcBef>
+                <a:spcPts val="0"/>
+              </a:spcBef>
+              <a:spcAft>
+                <a:spcPts val="0"/>
+              </a:spcAft>
+              <a:buNone/>
+            </a:pPr>
+            <a:endParaRPr/>
+          </a:p>
+        </p:txBody>
+      </p:sp>
+    </p:spTree>
+  </p:cSld>
+  <p:clrMapOvr>
+    <a:masterClrMapping/>
+  </p:clrMapOvr>
+</p:notes>
+</file>
+
+<file path=ppt/notesSlides/notesSlide9.xml><?xml version="1.0" encoding="utf-8"?>
+<p:notes xmlns:a="http://schemas.openxmlformats.org/drawingml/2006/main" xmlns:r="http://schemas.openxmlformats.org/officeDocument/2006/relationships" xmlns:p="http://schemas.openxmlformats.org/presentationml/2006/main" showMasterSp="0" showMasterPhAnim="0">
+  <p:cSld>
+    <p:spTree>
+      <p:nvGrpSpPr>
+        <p:cNvPr id="1" name="Shape 159"/>
+        <p:cNvGrpSpPr/>
+        <p:nvPr/>
+      </p:nvGrpSpPr>
+      <p:grpSpPr>
+        <a:xfrm>
+          <a:off x="0" y="0"/>
+          <a:ext cx="0" cy="0"/>
+          <a:chOff x="0" y="0"/>
+          <a:chExt cx="0" cy="0"/>
+        </a:xfrm>
+      </p:grpSpPr>
+      <p:sp>
+        <p:nvSpPr>
+          <p:cNvPr id="160" name="Google Shape;160;g22f7837bed4_0_15:notes"/>
+          <p:cNvSpPr>
+            <a:spLocks noGrp="1" noRot="1" noChangeAspect="1"/>
+          </p:cNvSpPr>
+          <p:nvPr>
+            <p:ph type="sldImg" idx="2"/>
+          </p:nvPr>
+        </p:nvSpPr>
+        <p:spPr>
+          <a:xfrm>
+            <a:off x="381300" y="685800"/>
+            <a:ext cx="6096000" cy="3429000"/>
+          </a:xfrm>
+          <a:custGeom>
+            <a:avLst/>
+            <a:gdLst/>
+            <a:ahLst/>
+            <a:cxnLst/>
+            <a:rect l="l" t="t" r="r" b="b"/>
+            <a:pathLst>
+              <a:path w="120000" h="120000" extrusionOk="0">
+                <a:moveTo>
+                  <a:pt x="0" y="0"/>
+                </a:moveTo>
+                <a:lnTo>
+                  <a:pt x="120000" y="0"/>
+                </a:lnTo>
+                <a:lnTo>
+                  <a:pt x="120000" y="120000"/>
+                </a:lnTo>
+                <a:lnTo>
+                  <a:pt x="0" y="120000"/>
+                </a:lnTo>
+                <a:close/>
+              </a:path>
+            </a:pathLst>
+          </a:custGeom>
+        </p:spPr>
+      </p:sp>
+      <p:sp>
+        <p:nvSpPr>
+          <p:cNvPr id="161" name="Google Shape;161;g22f7837bed4_0_15:notes"/>
           <p:cNvSpPr txBox="1">
             <a:spLocks noGrp="1"/>
           </p:cNvSpPr>
@@ -9027,822 +8922,6 @@
   <p:cSld>
     <p:spTree>
       <p:nvGrpSpPr>
-        <p:cNvPr id="1" name="Shape 162"/>
-        <p:cNvGrpSpPr/>
-        <p:nvPr/>
-      </p:nvGrpSpPr>
-      <p:grpSpPr>
-        <a:xfrm>
-          <a:off x="0" y="0"/>
-          <a:ext cx="0" cy="0"/>
-          <a:chOff x="0" y="0"/>
-          <a:chExt cx="0" cy="0"/>
-        </a:xfrm>
-      </p:grpSpPr>
-      <p:sp>
-        <p:nvSpPr>
-          <p:cNvPr id="163" name="Google Shape;163;p22"/>
-          <p:cNvSpPr txBox="1">
-            <a:spLocks noGrp="1"/>
-          </p:cNvSpPr>
-          <p:nvPr>
-            <p:ph type="title"/>
-          </p:nvPr>
-        </p:nvSpPr>
-        <p:spPr>
-          <a:xfrm>
-            <a:off x="311700" y="410000"/>
-            <a:ext cx="8520600" cy="607800"/>
-          </a:xfrm>
-          <a:prstGeom prst="rect">
-            <a:avLst/>
-          </a:prstGeom>
-        </p:spPr>
-        <p:txBody>
-          <a:bodyPr spcFirstLastPara="1" wrap="square" lIns="91425" tIns="91425" rIns="91425" bIns="91425" anchor="t" anchorCtr="0">
-            <a:noAutofit/>
-          </a:bodyPr>
-          <a:lstStyle/>
-          <a:p>
-            <a:pPr marL="0" lvl="0" indent="0" algn="l" rtl="0">
-              <a:spcBef>
-                <a:spcPts val="0"/>
-              </a:spcBef>
-              <a:spcAft>
-                <a:spcPts val="0"/>
-              </a:spcAft>
-              <a:buNone/>
-            </a:pPr>
-            <a:r>
-              <a:rPr lang="it"/>
-              <a:t>ZED cam</a:t>
-            </a:r>
-            <a:endParaRPr/>
-          </a:p>
-        </p:txBody>
-      </p:sp>
-      <p:pic>
-        <p:nvPicPr>
-          <p:cNvPr id="164" name="Google Shape;164;p22"/>
-          <p:cNvPicPr preferRelativeResize="0"/>
-          <p:nvPr/>
-        </p:nvPicPr>
-        <p:blipFill>
-          <a:blip r:embed="rId3">
-            <a:alphaModFix/>
-          </a:blip>
-          <a:stretch>
-            <a:fillRect/>
-          </a:stretch>
-        </p:blipFill>
-        <p:spPr>
-          <a:xfrm>
-            <a:off x="5860975" y="165362"/>
-            <a:ext cx="3283026" cy="1155625"/>
-          </a:xfrm>
-          <a:prstGeom prst="rect">
-            <a:avLst/>
-          </a:prstGeom>
-          <a:noFill/>
-          <a:ln>
-            <a:noFill/>
-          </a:ln>
-        </p:spPr>
-      </p:pic>
-      <p:pic>
-        <p:nvPicPr>
-          <p:cNvPr id="165" name="Google Shape;165;p22"/>
-          <p:cNvPicPr preferRelativeResize="0"/>
-          <p:nvPr/>
-        </p:nvPicPr>
-        <p:blipFill>
-          <a:blip r:embed="rId4">
-            <a:alphaModFix/>
-          </a:blip>
-          <a:stretch>
-            <a:fillRect/>
-          </a:stretch>
-        </p:blipFill>
-        <p:spPr>
-          <a:xfrm>
-            <a:off x="5860975" y="1321000"/>
-            <a:ext cx="3283024" cy="2038420"/>
-          </a:xfrm>
-          <a:prstGeom prst="rect">
-            <a:avLst/>
-          </a:prstGeom>
-          <a:noFill/>
-          <a:ln>
-            <a:noFill/>
-          </a:ln>
-        </p:spPr>
-      </p:pic>
-      <p:sp>
-        <p:nvSpPr>
-          <p:cNvPr id="166" name="Google Shape;166;p22"/>
-          <p:cNvSpPr txBox="1"/>
-          <p:nvPr/>
-        </p:nvSpPr>
-        <p:spPr>
-          <a:xfrm>
-            <a:off x="311700" y="1249575"/>
-            <a:ext cx="5837700" cy="1046700"/>
-          </a:xfrm>
-          <a:prstGeom prst="rect">
-            <a:avLst/>
-          </a:prstGeom>
-          <a:noFill/>
-          <a:ln>
-            <a:noFill/>
-          </a:ln>
-        </p:spPr>
-        <p:txBody>
-          <a:bodyPr spcFirstLastPara="1" wrap="square" lIns="91425" tIns="91425" rIns="91425" bIns="91425" anchor="t" anchorCtr="0">
-            <a:spAutoFit/>
-          </a:bodyPr>
-          <a:lstStyle/>
-          <a:p>
-            <a:pPr marL="457200" lvl="0" indent="-317500" algn="l" rtl="0">
-              <a:spcBef>
-                <a:spcPts val="0"/>
-              </a:spcBef>
-              <a:spcAft>
-                <a:spcPts val="0"/>
-              </a:spcAft>
-              <a:buSzPts val="1400"/>
-              <a:buFont typeface="Roboto"/>
-              <a:buChar char="●"/>
-            </a:pPr>
-            <a:r>
-              <a:rPr lang="it">
-                <a:latin typeface="Roboto"/>
-                <a:ea typeface="Roboto"/>
-                <a:cs typeface="Roboto"/>
-                <a:sym typeface="Roboto"/>
-              </a:rPr>
-              <a:t>Neural depth sensing</a:t>
-            </a:r>
-            <a:endParaRPr>
-              <a:latin typeface="Roboto"/>
-              <a:ea typeface="Roboto"/>
-              <a:cs typeface="Roboto"/>
-              <a:sym typeface="Roboto"/>
-            </a:endParaRPr>
-          </a:p>
-          <a:p>
-            <a:pPr marL="457200" lvl="0" indent="-317500" algn="l" rtl="0">
-              <a:spcBef>
-                <a:spcPts val="0"/>
-              </a:spcBef>
-              <a:spcAft>
-                <a:spcPts val="0"/>
-              </a:spcAft>
-              <a:buSzPts val="1400"/>
-              <a:buFont typeface="Roboto"/>
-              <a:buChar char="●"/>
-            </a:pPr>
-            <a:r>
-              <a:rPr lang="it">
-                <a:latin typeface="Roboto"/>
-                <a:ea typeface="Roboto"/>
-                <a:cs typeface="Roboto"/>
-                <a:sym typeface="Roboto"/>
-              </a:rPr>
-              <a:t>Ultrawide field of view with low distortions</a:t>
-            </a:r>
-            <a:endParaRPr>
-              <a:latin typeface="Roboto"/>
-              <a:ea typeface="Roboto"/>
-              <a:cs typeface="Roboto"/>
-              <a:sym typeface="Roboto"/>
-            </a:endParaRPr>
-          </a:p>
-          <a:p>
-            <a:pPr marL="457200" lvl="0" indent="-317500" algn="l" rtl="0">
-              <a:spcBef>
-                <a:spcPts val="0"/>
-              </a:spcBef>
-              <a:spcAft>
-                <a:spcPts val="0"/>
-              </a:spcAft>
-              <a:buSzPts val="1400"/>
-              <a:buFont typeface="Roboto"/>
-              <a:buChar char="●"/>
-            </a:pPr>
-            <a:r>
-              <a:rPr lang="it">
-                <a:latin typeface="Roboto"/>
-                <a:ea typeface="Roboto"/>
-                <a:cs typeface="Roboto"/>
-                <a:sym typeface="Roboto"/>
-              </a:rPr>
-              <a:t>Complete sensor stack</a:t>
-            </a:r>
-            <a:endParaRPr>
-              <a:latin typeface="Roboto"/>
-              <a:ea typeface="Roboto"/>
-              <a:cs typeface="Roboto"/>
-              <a:sym typeface="Roboto"/>
-            </a:endParaRPr>
-          </a:p>
-          <a:p>
-            <a:pPr marL="457200" lvl="0" indent="-317500" algn="l" rtl="0">
-              <a:spcBef>
-                <a:spcPts val="0"/>
-              </a:spcBef>
-              <a:spcAft>
-                <a:spcPts val="0"/>
-              </a:spcAft>
-              <a:buSzPts val="1400"/>
-              <a:buFont typeface="Roboto"/>
-              <a:buChar char="●"/>
-            </a:pPr>
-            <a:r>
-              <a:rPr lang="it">
-                <a:latin typeface="Roboto"/>
-                <a:ea typeface="Roboto"/>
-                <a:cs typeface="Roboto"/>
-                <a:sym typeface="Roboto"/>
-              </a:rPr>
-              <a:t>Thermal control</a:t>
-            </a:r>
-            <a:endParaRPr>
-              <a:latin typeface="Roboto"/>
-              <a:ea typeface="Roboto"/>
-              <a:cs typeface="Roboto"/>
-              <a:sym typeface="Roboto"/>
-            </a:endParaRPr>
-          </a:p>
-        </p:txBody>
-      </p:sp>
-      <p:grpSp>
-        <p:nvGrpSpPr>
-          <p:cNvPr id="167" name="Google Shape;167;p22"/>
-          <p:cNvGrpSpPr/>
-          <p:nvPr/>
-        </p:nvGrpSpPr>
-        <p:grpSpPr>
-          <a:xfrm>
-            <a:off x="152411" y="2372475"/>
-            <a:ext cx="2547000" cy="2547000"/>
-            <a:chOff x="1293736" y="1258050"/>
-            <a:chExt cx="2547000" cy="2547000"/>
-          </a:xfrm>
-        </p:grpSpPr>
-        <p:sp>
-          <p:nvSpPr>
-            <p:cNvPr id="168" name="Google Shape;168;p22"/>
-            <p:cNvSpPr/>
-            <p:nvPr/>
-          </p:nvSpPr>
-          <p:spPr>
-            <a:xfrm rot="2700000">
-              <a:off x="2286374" y="1011412"/>
-              <a:ext cx="561726" cy="3040276"/>
-            </a:xfrm>
-            <a:prstGeom prst="roundRect">
-              <a:avLst>
-                <a:gd name="adj" fmla="val 50000"/>
-              </a:avLst>
-            </a:prstGeom>
-            <a:solidFill>
-              <a:srgbClr val="0944A1"/>
-            </a:solidFill>
-            <a:ln>
-              <a:noFill/>
-            </a:ln>
-          </p:spPr>
-          <p:txBody>
-            <a:bodyPr spcFirstLastPara="1" wrap="square" lIns="91425" tIns="91425" rIns="91425" bIns="91425" anchor="ctr" anchorCtr="0">
-              <a:noAutofit/>
-            </a:bodyPr>
-            <a:lstStyle/>
-            <a:p>
-              <a:pPr marL="0" lvl="0" indent="0" algn="l" rtl="0">
-                <a:spcBef>
-                  <a:spcPts val="0"/>
-                </a:spcBef>
-                <a:spcAft>
-                  <a:spcPts val="0"/>
-                </a:spcAft>
-                <a:buNone/>
-              </a:pPr>
-              <a:endParaRPr/>
-            </a:p>
-          </p:txBody>
-        </p:sp>
-        <p:sp>
-          <p:nvSpPr>
-            <p:cNvPr id="169" name="Google Shape;169;p22"/>
-            <p:cNvSpPr/>
-            <p:nvPr/>
-          </p:nvSpPr>
-          <p:spPr>
-            <a:xfrm>
-              <a:off x="1510752" y="3205393"/>
-              <a:ext cx="374100" cy="374100"/>
-            </a:xfrm>
-            <a:prstGeom prst="ellipse">
-              <a:avLst/>
-            </a:prstGeom>
-            <a:solidFill>
-              <a:srgbClr val="FFFFFF"/>
-            </a:solidFill>
-            <a:ln>
-              <a:noFill/>
-            </a:ln>
-            <a:effectLst>
-              <a:outerShdw blurRad="228600" dist="50800" dir="5400000" algn="tl" rotWithShape="0">
-                <a:srgbClr val="000000">
-                  <a:alpha val="54900"/>
-                </a:srgbClr>
-              </a:outerShdw>
-            </a:effectLst>
-          </p:spPr>
-          <p:txBody>
-            <a:bodyPr spcFirstLastPara="1" wrap="square" lIns="91425" tIns="91425" rIns="91425" bIns="91425" anchor="ctr" anchorCtr="0">
-              <a:noAutofit/>
-            </a:bodyPr>
-            <a:lstStyle/>
-            <a:p>
-              <a:pPr marL="0" lvl="0" indent="0" algn="ctr" rtl="0">
-                <a:spcBef>
-                  <a:spcPts val="0"/>
-                </a:spcBef>
-                <a:spcAft>
-                  <a:spcPts val="0"/>
-                </a:spcAft>
-                <a:buNone/>
-              </a:pPr>
-              <a:r>
-                <a:rPr lang="it" sz="1200" b="1">
-                  <a:solidFill>
-                    <a:srgbClr val="0944A1"/>
-                  </a:solidFill>
-                  <a:latin typeface="Roboto"/>
-                  <a:ea typeface="Roboto"/>
-                  <a:cs typeface="Roboto"/>
-                  <a:sym typeface="Roboto"/>
-                </a:rPr>
-                <a:t>1</a:t>
-              </a:r>
-              <a:endParaRPr sz="1200" b="1">
-                <a:solidFill>
-                  <a:srgbClr val="0944A1"/>
-                </a:solidFill>
-                <a:latin typeface="Roboto"/>
-                <a:ea typeface="Roboto"/>
-                <a:cs typeface="Roboto"/>
-                <a:sym typeface="Roboto"/>
-              </a:endParaRPr>
-            </a:p>
-          </p:txBody>
-        </p:sp>
-        <p:sp>
-          <p:nvSpPr>
-            <p:cNvPr id="170" name="Google Shape;170;p22"/>
-            <p:cNvSpPr txBox="1"/>
-            <p:nvPr/>
-          </p:nvSpPr>
-          <p:spPr>
-            <a:xfrm rot="-2700000">
-              <a:off x="1501398" y="2241353"/>
-              <a:ext cx="2332604" cy="393293"/>
-            </a:xfrm>
-            <a:prstGeom prst="rect">
-              <a:avLst/>
-            </a:prstGeom>
-            <a:noFill/>
-            <a:ln>
-              <a:noFill/>
-            </a:ln>
-          </p:spPr>
-          <p:txBody>
-            <a:bodyPr spcFirstLastPara="1" wrap="square" lIns="91425" tIns="91425" rIns="91425" bIns="91425" anchor="ctr" anchorCtr="0">
-              <a:noAutofit/>
-            </a:bodyPr>
-            <a:lstStyle/>
-            <a:p>
-              <a:pPr marL="0" lvl="0" indent="0" algn="l" rtl="0">
-                <a:lnSpc>
-                  <a:spcPct val="115000"/>
-                </a:lnSpc>
-                <a:spcBef>
-                  <a:spcPts val="0"/>
-                </a:spcBef>
-                <a:spcAft>
-                  <a:spcPts val="0"/>
-                </a:spcAft>
-                <a:buNone/>
-              </a:pPr>
-              <a:r>
-                <a:rPr lang="it" sz="1200" b="1">
-                  <a:solidFill>
-                    <a:srgbClr val="FFFFFF"/>
-                  </a:solidFill>
-                  <a:latin typeface="Roboto"/>
-                  <a:ea typeface="Roboto"/>
-                  <a:cs typeface="Roboto"/>
-                  <a:sym typeface="Roboto"/>
-                </a:rPr>
-                <a:t>Simultaneos localization and mapping</a:t>
-              </a:r>
-              <a:endParaRPr sz="800" b="1">
-                <a:solidFill>
-                  <a:srgbClr val="FFFFFF"/>
-                </a:solidFill>
-                <a:latin typeface="Roboto"/>
-                <a:ea typeface="Roboto"/>
-                <a:cs typeface="Roboto"/>
-                <a:sym typeface="Roboto"/>
-              </a:endParaRPr>
-            </a:p>
-          </p:txBody>
-        </p:sp>
-      </p:grpSp>
-      <p:grpSp>
-        <p:nvGrpSpPr>
-          <p:cNvPr id="171" name="Google Shape;171;p22"/>
-          <p:cNvGrpSpPr/>
-          <p:nvPr/>
-        </p:nvGrpSpPr>
-        <p:grpSpPr>
-          <a:xfrm>
-            <a:off x="1605458" y="2356325"/>
-            <a:ext cx="2547000" cy="2547000"/>
-            <a:chOff x="3203958" y="1258050"/>
-            <a:chExt cx="2547000" cy="2547000"/>
-          </a:xfrm>
-        </p:grpSpPr>
-        <p:sp>
-          <p:nvSpPr>
-            <p:cNvPr id="172" name="Google Shape;172;p22"/>
-            <p:cNvSpPr/>
-            <p:nvPr/>
-          </p:nvSpPr>
-          <p:spPr>
-            <a:xfrm rot="2700000">
-              <a:off x="4196595" y="1011412"/>
-              <a:ext cx="561726" cy="3040276"/>
-            </a:xfrm>
-            <a:prstGeom prst="roundRect">
-              <a:avLst>
-                <a:gd name="adj" fmla="val 50000"/>
-              </a:avLst>
-            </a:prstGeom>
-            <a:solidFill>
-              <a:srgbClr val="0D5DDF"/>
-            </a:solidFill>
-            <a:ln>
-              <a:noFill/>
-            </a:ln>
-          </p:spPr>
-          <p:txBody>
-            <a:bodyPr spcFirstLastPara="1" wrap="square" lIns="91425" tIns="91425" rIns="91425" bIns="91425" anchor="ctr" anchorCtr="0">
-              <a:noAutofit/>
-            </a:bodyPr>
-            <a:lstStyle/>
-            <a:p>
-              <a:pPr marL="0" lvl="0" indent="0" algn="l" rtl="0">
-                <a:spcBef>
-                  <a:spcPts val="0"/>
-                </a:spcBef>
-                <a:spcAft>
-                  <a:spcPts val="0"/>
-                </a:spcAft>
-                <a:buNone/>
-              </a:pPr>
-              <a:endParaRPr/>
-            </a:p>
-          </p:txBody>
-        </p:sp>
-        <p:sp>
-          <p:nvSpPr>
-            <p:cNvPr id="173" name="Google Shape;173;p22"/>
-            <p:cNvSpPr/>
-            <p:nvPr/>
-          </p:nvSpPr>
-          <p:spPr>
-            <a:xfrm>
-              <a:off x="3420974" y="3205393"/>
-              <a:ext cx="374100" cy="374100"/>
-            </a:xfrm>
-            <a:prstGeom prst="ellipse">
-              <a:avLst/>
-            </a:prstGeom>
-            <a:solidFill>
-              <a:srgbClr val="FFFFFF"/>
-            </a:solidFill>
-            <a:ln>
-              <a:noFill/>
-            </a:ln>
-            <a:effectLst>
-              <a:outerShdw blurRad="228600" dist="50800" dir="5400000" algn="tl" rotWithShape="0">
-                <a:srgbClr val="000000">
-                  <a:alpha val="54900"/>
-                </a:srgbClr>
-              </a:outerShdw>
-            </a:effectLst>
-          </p:spPr>
-          <p:txBody>
-            <a:bodyPr spcFirstLastPara="1" wrap="square" lIns="91425" tIns="91425" rIns="91425" bIns="91425" anchor="ctr" anchorCtr="0">
-              <a:noAutofit/>
-            </a:bodyPr>
-            <a:lstStyle/>
-            <a:p>
-              <a:pPr marL="0" lvl="0" indent="0" algn="ctr" rtl="0">
-                <a:spcBef>
-                  <a:spcPts val="0"/>
-                </a:spcBef>
-                <a:spcAft>
-                  <a:spcPts val="0"/>
-                </a:spcAft>
-                <a:buNone/>
-              </a:pPr>
-              <a:r>
-                <a:rPr lang="it" sz="1200" b="1">
-                  <a:solidFill>
-                    <a:srgbClr val="0D5DDF"/>
-                  </a:solidFill>
-                  <a:latin typeface="Roboto"/>
-                  <a:ea typeface="Roboto"/>
-                  <a:cs typeface="Roboto"/>
-                  <a:sym typeface="Roboto"/>
-                </a:rPr>
-                <a:t>2</a:t>
-              </a:r>
-              <a:endParaRPr sz="1200" b="1">
-                <a:solidFill>
-                  <a:srgbClr val="0D5DDF"/>
-                </a:solidFill>
-                <a:latin typeface="Roboto"/>
-                <a:ea typeface="Roboto"/>
-                <a:cs typeface="Roboto"/>
-                <a:sym typeface="Roboto"/>
-              </a:endParaRPr>
-            </a:p>
-          </p:txBody>
-        </p:sp>
-        <p:sp>
-          <p:nvSpPr>
-            <p:cNvPr id="174" name="Google Shape;174;p22"/>
-            <p:cNvSpPr txBox="1"/>
-            <p:nvPr/>
-          </p:nvSpPr>
-          <p:spPr>
-            <a:xfrm rot="-2700000">
-              <a:off x="3410687" y="2240903"/>
-              <a:ext cx="2333877" cy="393293"/>
-            </a:xfrm>
-            <a:prstGeom prst="rect">
-              <a:avLst/>
-            </a:prstGeom>
-            <a:noFill/>
-            <a:ln>
-              <a:noFill/>
-            </a:ln>
-          </p:spPr>
-          <p:txBody>
-            <a:bodyPr spcFirstLastPara="1" wrap="square" lIns="91425" tIns="91425" rIns="91425" bIns="91425" anchor="ctr" anchorCtr="0">
-              <a:noAutofit/>
-            </a:bodyPr>
-            <a:lstStyle/>
-            <a:p>
-              <a:pPr marL="0" lvl="0" indent="0" algn="l" rtl="0">
-                <a:lnSpc>
-                  <a:spcPct val="115000"/>
-                </a:lnSpc>
-                <a:spcBef>
-                  <a:spcPts val="0"/>
-                </a:spcBef>
-                <a:spcAft>
-                  <a:spcPts val="0"/>
-                </a:spcAft>
-                <a:buNone/>
-              </a:pPr>
-              <a:r>
-                <a:rPr lang="it" sz="1200" b="1">
-                  <a:solidFill>
-                    <a:srgbClr val="FFFFFF"/>
-                  </a:solidFill>
-                  <a:latin typeface="Roboto"/>
-                  <a:ea typeface="Roboto"/>
-                  <a:cs typeface="Roboto"/>
-                  <a:sym typeface="Roboto"/>
-                </a:rPr>
-                <a:t>Floor plane detection</a:t>
-              </a:r>
-              <a:endParaRPr sz="800" b="1">
-                <a:solidFill>
-                  <a:srgbClr val="FFFFFF"/>
-                </a:solidFill>
-                <a:latin typeface="Roboto"/>
-                <a:ea typeface="Roboto"/>
-                <a:cs typeface="Roboto"/>
-                <a:sym typeface="Roboto"/>
-              </a:endParaRPr>
-            </a:p>
-          </p:txBody>
-        </p:sp>
-      </p:grpSp>
-      <p:grpSp>
-        <p:nvGrpSpPr>
-          <p:cNvPr id="175" name="Google Shape;175;p22"/>
-          <p:cNvGrpSpPr/>
-          <p:nvPr/>
-        </p:nvGrpSpPr>
-        <p:grpSpPr>
-          <a:xfrm>
-            <a:off x="3069002" y="2372475"/>
-            <a:ext cx="2547000" cy="2547000"/>
-            <a:chOff x="5123977" y="1258050"/>
-            <a:chExt cx="2547000" cy="2547000"/>
-          </a:xfrm>
-        </p:grpSpPr>
-        <p:sp>
-          <p:nvSpPr>
-            <p:cNvPr id="176" name="Google Shape;176;p22"/>
-            <p:cNvSpPr/>
-            <p:nvPr/>
-          </p:nvSpPr>
-          <p:spPr>
-            <a:xfrm rot="2700000">
-              <a:off x="6116614" y="1011412"/>
-              <a:ext cx="561726" cy="3040276"/>
-            </a:xfrm>
-            <a:prstGeom prst="roundRect">
-              <a:avLst>
-                <a:gd name="adj" fmla="val 50000"/>
-              </a:avLst>
-            </a:prstGeom>
-            <a:solidFill>
-              <a:srgbClr val="307BF3"/>
-            </a:solidFill>
-            <a:ln>
-              <a:noFill/>
-            </a:ln>
-          </p:spPr>
-          <p:txBody>
-            <a:bodyPr spcFirstLastPara="1" wrap="square" lIns="91425" tIns="91425" rIns="91425" bIns="91425" anchor="ctr" anchorCtr="0">
-              <a:noAutofit/>
-            </a:bodyPr>
-            <a:lstStyle/>
-            <a:p>
-              <a:pPr marL="0" lvl="0" indent="0" algn="l" rtl="0">
-                <a:spcBef>
-                  <a:spcPts val="0"/>
-                </a:spcBef>
-                <a:spcAft>
-                  <a:spcPts val="0"/>
-                </a:spcAft>
-                <a:buNone/>
-              </a:pPr>
-              <a:endParaRPr/>
-            </a:p>
-          </p:txBody>
-        </p:sp>
-        <p:sp>
-          <p:nvSpPr>
-            <p:cNvPr id="177" name="Google Shape;177;p22"/>
-            <p:cNvSpPr/>
-            <p:nvPr/>
-          </p:nvSpPr>
-          <p:spPr>
-            <a:xfrm>
-              <a:off x="5340992" y="3205393"/>
-              <a:ext cx="374100" cy="374100"/>
-            </a:xfrm>
-            <a:prstGeom prst="ellipse">
-              <a:avLst/>
-            </a:prstGeom>
-            <a:solidFill>
-              <a:srgbClr val="FFFFFF"/>
-            </a:solidFill>
-            <a:ln>
-              <a:noFill/>
-            </a:ln>
-            <a:effectLst>
-              <a:outerShdw blurRad="228600" dist="50800" dir="5400000" algn="tl" rotWithShape="0">
-                <a:srgbClr val="000000">
-                  <a:alpha val="54900"/>
-                </a:srgbClr>
-              </a:outerShdw>
-            </a:effectLst>
-          </p:spPr>
-          <p:txBody>
-            <a:bodyPr spcFirstLastPara="1" wrap="square" lIns="91425" tIns="91425" rIns="91425" bIns="91425" anchor="ctr" anchorCtr="0">
-              <a:noAutofit/>
-            </a:bodyPr>
-            <a:lstStyle/>
-            <a:p>
-              <a:pPr marL="0" lvl="0" indent="0" algn="ctr" rtl="0">
-                <a:spcBef>
-                  <a:spcPts val="0"/>
-                </a:spcBef>
-                <a:spcAft>
-                  <a:spcPts val="0"/>
-                </a:spcAft>
-                <a:buNone/>
-              </a:pPr>
-              <a:r>
-                <a:rPr lang="it" sz="1200" b="1">
-                  <a:solidFill>
-                    <a:srgbClr val="307BF3"/>
-                  </a:solidFill>
-                  <a:latin typeface="Roboto"/>
-                  <a:ea typeface="Roboto"/>
-                  <a:cs typeface="Roboto"/>
-                  <a:sym typeface="Roboto"/>
-                </a:rPr>
-                <a:t>3</a:t>
-              </a:r>
-              <a:endParaRPr sz="1200" b="1">
-                <a:solidFill>
-                  <a:srgbClr val="307BF3"/>
-                </a:solidFill>
-                <a:latin typeface="Roboto"/>
-                <a:ea typeface="Roboto"/>
-                <a:cs typeface="Roboto"/>
-                <a:sym typeface="Roboto"/>
-              </a:endParaRPr>
-            </a:p>
-          </p:txBody>
-        </p:sp>
-        <p:sp>
-          <p:nvSpPr>
-            <p:cNvPr id="178" name="Google Shape;178;p22"/>
-            <p:cNvSpPr txBox="1"/>
-            <p:nvPr/>
-          </p:nvSpPr>
-          <p:spPr>
-            <a:xfrm rot="-2700000">
-              <a:off x="5323969" y="2238203"/>
-              <a:ext cx="2341513" cy="393293"/>
-            </a:xfrm>
-            <a:prstGeom prst="rect">
-              <a:avLst/>
-            </a:prstGeom>
-            <a:noFill/>
-            <a:ln>
-              <a:noFill/>
-            </a:ln>
-          </p:spPr>
-          <p:txBody>
-            <a:bodyPr spcFirstLastPara="1" wrap="square" lIns="91425" tIns="91425" rIns="91425" bIns="91425" anchor="ctr" anchorCtr="0">
-              <a:noAutofit/>
-            </a:bodyPr>
-            <a:lstStyle/>
-            <a:p>
-              <a:pPr marL="0" lvl="0" indent="0" algn="l" rtl="0">
-                <a:lnSpc>
-                  <a:spcPct val="115000"/>
-                </a:lnSpc>
-                <a:spcBef>
-                  <a:spcPts val="0"/>
-                </a:spcBef>
-                <a:spcAft>
-                  <a:spcPts val="0"/>
-                </a:spcAft>
-                <a:buNone/>
-              </a:pPr>
-              <a:r>
-                <a:rPr lang="it" sz="1200" b="1">
-                  <a:solidFill>
-                    <a:srgbClr val="FFFFFF"/>
-                  </a:solidFill>
-                  <a:latin typeface="Roboto"/>
-                  <a:ea typeface="Roboto"/>
-                  <a:cs typeface="Roboto"/>
-                  <a:sym typeface="Roboto"/>
-                </a:rPr>
-                <a:t>Skeleton tracking</a:t>
-              </a:r>
-              <a:endParaRPr sz="800" b="1">
-                <a:solidFill>
-                  <a:srgbClr val="FFFFFF"/>
-                </a:solidFill>
-                <a:latin typeface="Roboto"/>
-                <a:ea typeface="Roboto"/>
-                <a:cs typeface="Roboto"/>
-                <a:sym typeface="Roboto"/>
-              </a:endParaRPr>
-            </a:p>
-          </p:txBody>
-        </p:sp>
-      </p:grpSp>
-    </p:spTree>
-  </p:cSld>
-  <p:clrMapOvr>
-    <a:masterClrMapping/>
-  </p:clrMapOvr>
-</p:sld>
-</file>
-
-<file path=ppt/slides/slide11.xml><?xml version="1.0" encoding="utf-8"?>
-<p:sld xmlns:a="http://schemas.openxmlformats.org/drawingml/2006/main" xmlns:r="http://schemas.openxmlformats.org/officeDocument/2006/relationships" xmlns:p="http://schemas.openxmlformats.org/presentationml/2006/main">
-  <p:cSld>
-    <p:spTree>
-      <p:nvGrpSpPr>
         <p:cNvPr id="1" name="Shape 182"/>
         <p:cNvGrpSpPr/>
         <p:nvPr/>
@@ -10129,7 +9208,7 @@
 </p:sld>
 </file>
 
-<file path=ppt/slides/slide12.xml><?xml version="1.0" encoding="utf-8"?>
+<file path=ppt/slides/slide11.xml><?xml version="1.0" encoding="utf-8"?>
 <p:sld xmlns:a="http://schemas.openxmlformats.org/drawingml/2006/main" xmlns:r="http://schemas.openxmlformats.org/officeDocument/2006/relationships" xmlns:p="http://schemas.openxmlformats.org/presentationml/2006/main">
   <p:cSld>
     <p:spTree>
@@ -10345,7 +9424,7 @@
 </p:sld>
 </file>
 
-<file path=ppt/slides/slide13.xml><?xml version="1.0" encoding="utf-8"?>
+<file path=ppt/slides/slide12.xml><?xml version="1.0" encoding="utf-8"?>
 <p:sld xmlns:a="http://schemas.openxmlformats.org/drawingml/2006/main" xmlns:r="http://schemas.openxmlformats.org/officeDocument/2006/relationships" xmlns:p="http://schemas.openxmlformats.org/presentationml/2006/main">
   <p:cSld>
     <p:spTree>
@@ -10564,7 +9643,7 @@
 </p:sld>
 </file>
 
-<file path=ppt/slides/slide14.xml><?xml version="1.0" encoding="utf-8"?>
+<file path=ppt/slides/slide13.xml><?xml version="1.0" encoding="utf-8"?>
 <p:sld xmlns:a="http://schemas.openxmlformats.org/drawingml/2006/main" xmlns:r="http://schemas.openxmlformats.org/officeDocument/2006/relationships" xmlns:p="http://schemas.openxmlformats.org/presentationml/2006/main">
   <p:cSld>
     <p:spTree>
@@ -10631,7 +9710,7 @@
 </p:sld>
 </file>
 
-<file path=ppt/slides/slide15.xml><?xml version="1.0" encoding="utf-8"?>
+<file path=ppt/slides/slide14.xml><?xml version="1.0" encoding="utf-8"?>
 <p:sld xmlns:a="http://schemas.openxmlformats.org/drawingml/2006/main" xmlns:r="http://schemas.openxmlformats.org/officeDocument/2006/relationships" xmlns:p="http://schemas.openxmlformats.org/presentationml/2006/main">
   <p:cSld>
     <p:spTree>
@@ -11683,508 +10762,6 @@
   <p:cSld>
     <p:spTree>
       <p:nvGrpSpPr>
-        <p:cNvPr id="1" name="Shape 103"/>
-        <p:cNvGrpSpPr/>
-        <p:nvPr/>
-      </p:nvGrpSpPr>
-      <p:grpSpPr>
-        <a:xfrm>
-          <a:off x="0" y="0"/>
-          <a:ext cx="0" cy="0"/>
-          <a:chOff x="0" y="0"/>
-          <a:chExt cx="0" cy="0"/>
-        </a:xfrm>
-      </p:grpSpPr>
-      <p:sp>
-        <p:nvSpPr>
-          <p:cNvPr id="104" name="Google Shape;104;p16"/>
-          <p:cNvSpPr txBox="1">
-            <a:spLocks noGrp="1"/>
-          </p:cNvSpPr>
-          <p:nvPr>
-            <p:ph type="title"/>
-          </p:nvPr>
-        </p:nvSpPr>
-        <p:spPr>
-          <a:xfrm>
-            <a:off x="311700" y="410000"/>
-            <a:ext cx="8520600" cy="607800"/>
-          </a:xfrm>
-          <a:prstGeom prst="rect">
-            <a:avLst/>
-          </a:prstGeom>
-        </p:spPr>
-        <p:txBody>
-          <a:bodyPr spcFirstLastPara="1" wrap="square" lIns="91425" tIns="91425" rIns="91425" bIns="91425" anchor="t" anchorCtr="0">
-            <a:noAutofit/>
-          </a:bodyPr>
-          <a:lstStyle/>
-          <a:p>
-            <a:pPr marL="0" lvl="0" indent="0" algn="l" rtl="0">
-              <a:spcBef>
-                <a:spcPts val="0"/>
-              </a:spcBef>
-              <a:spcAft>
-                <a:spcPts val="0"/>
-              </a:spcAft>
-              <a:buNone/>
-            </a:pPr>
-            <a:r>
-              <a:rPr lang="it"/>
-              <a:t>State of the art</a:t>
-            </a:r>
-            <a:endParaRPr/>
-          </a:p>
-        </p:txBody>
-      </p:sp>
-      <p:sp>
-        <p:nvSpPr>
-          <p:cNvPr id="105" name="Google Shape;105;p16"/>
-          <p:cNvSpPr/>
-          <p:nvPr/>
-        </p:nvSpPr>
-        <p:spPr>
-          <a:xfrm>
-            <a:off x="311700" y="2124825"/>
-            <a:ext cx="1516200" cy="1136100"/>
-          </a:xfrm>
-          <a:prstGeom prst="homePlate">
-            <a:avLst>
-              <a:gd name="adj" fmla="val 50000"/>
-            </a:avLst>
-          </a:prstGeom>
-          <a:solidFill>
-            <a:schemeClr val="dk1"/>
-          </a:solidFill>
-          <a:ln>
-            <a:noFill/>
-          </a:ln>
-        </p:spPr>
-        <p:txBody>
-          <a:bodyPr spcFirstLastPara="1" wrap="square" lIns="121875" tIns="121875" rIns="121875" bIns="121875" anchor="ctr" anchorCtr="0">
-            <a:noAutofit/>
-          </a:bodyPr>
-          <a:lstStyle/>
-          <a:p>
-            <a:pPr marL="0" lvl="0" indent="0" algn="l" rtl="0">
-              <a:spcBef>
-                <a:spcPts val="0"/>
-              </a:spcBef>
-              <a:spcAft>
-                <a:spcPts val="0"/>
-              </a:spcAft>
-              <a:buNone/>
-            </a:pPr>
-            <a:endParaRPr/>
-          </a:p>
-        </p:txBody>
-      </p:sp>
-      <p:sp>
-        <p:nvSpPr>
-          <p:cNvPr id="106" name="Google Shape;106;p16"/>
-          <p:cNvSpPr txBox="1">
-            <a:spLocks noGrp="1"/>
-          </p:cNvSpPr>
-          <p:nvPr>
-            <p:ph type="body" idx="4294967295"/>
-          </p:nvPr>
-        </p:nvSpPr>
-        <p:spPr>
-          <a:xfrm>
-            <a:off x="311700" y="2399074"/>
-            <a:ext cx="2257200" cy="587700"/>
-          </a:xfrm>
-          <a:prstGeom prst="rect">
-            <a:avLst/>
-          </a:prstGeom>
-        </p:spPr>
-        <p:txBody>
-          <a:bodyPr spcFirstLastPara="1" wrap="square" lIns="91425" tIns="91425" rIns="91425" bIns="91425" anchor="ctr" anchorCtr="0">
-            <a:noAutofit/>
-          </a:bodyPr>
-          <a:lstStyle/>
-          <a:p>
-            <a:pPr marL="0" lvl="0" indent="0" algn="l" rtl="0">
-              <a:lnSpc>
-                <a:spcPct val="100000"/>
-              </a:lnSpc>
-              <a:spcBef>
-                <a:spcPts val="0"/>
-              </a:spcBef>
-              <a:spcAft>
-                <a:spcPts val="0"/>
-              </a:spcAft>
-              <a:buNone/>
-            </a:pPr>
-            <a:endParaRPr>
-              <a:solidFill>
-                <a:schemeClr val="lt1"/>
-              </a:solidFill>
-            </a:endParaRPr>
-          </a:p>
-        </p:txBody>
-      </p:sp>
-      <p:sp>
-        <p:nvSpPr>
-          <p:cNvPr id="107" name="Google Shape;107;p16"/>
-          <p:cNvSpPr/>
-          <p:nvPr/>
-        </p:nvSpPr>
-        <p:spPr>
-          <a:xfrm>
-            <a:off x="1978051" y="2124825"/>
-            <a:ext cx="1720200" cy="1136100"/>
-          </a:xfrm>
-          <a:prstGeom prst="chevron">
-            <a:avLst>
-              <a:gd name="adj" fmla="val 50000"/>
-            </a:avLst>
-          </a:prstGeom>
-          <a:solidFill>
-            <a:schemeClr val="dk1"/>
-          </a:solidFill>
-          <a:ln>
-            <a:noFill/>
-          </a:ln>
-        </p:spPr>
-        <p:txBody>
-          <a:bodyPr spcFirstLastPara="1" wrap="square" lIns="121875" tIns="121875" rIns="121875" bIns="121875" anchor="ctr" anchorCtr="0">
-            <a:noAutofit/>
-          </a:bodyPr>
-          <a:lstStyle/>
-          <a:p>
-            <a:pPr marL="0" lvl="0" indent="0" algn="l" rtl="0">
-              <a:spcBef>
-                <a:spcPts val="0"/>
-              </a:spcBef>
-              <a:spcAft>
-                <a:spcPts val="0"/>
-              </a:spcAft>
-              <a:buNone/>
-            </a:pPr>
-            <a:endParaRPr/>
-          </a:p>
-        </p:txBody>
-      </p:sp>
-      <p:sp>
-        <p:nvSpPr>
-          <p:cNvPr id="108" name="Google Shape;108;p16"/>
-          <p:cNvSpPr txBox="1">
-            <a:spLocks noGrp="1"/>
-          </p:cNvSpPr>
-          <p:nvPr>
-            <p:ph type="body" idx="4294967295"/>
-          </p:nvPr>
-        </p:nvSpPr>
-        <p:spPr>
-          <a:xfrm>
-            <a:off x="2291175" y="2399074"/>
-            <a:ext cx="2257200" cy="587700"/>
-          </a:xfrm>
-          <a:prstGeom prst="rect">
-            <a:avLst/>
-          </a:prstGeom>
-        </p:spPr>
-        <p:txBody>
-          <a:bodyPr spcFirstLastPara="1" wrap="square" lIns="91425" tIns="91425" rIns="91425" bIns="91425" anchor="ctr" anchorCtr="0">
-            <a:noAutofit/>
-          </a:bodyPr>
-          <a:lstStyle/>
-          <a:p>
-            <a:pPr marL="0" lvl="0" indent="0" algn="l" rtl="0">
-              <a:lnSpc>
-                <a:spcPct val="100000"/>
-              </a:lnSpc>
-              <a:spcBef>
-                <a:spcPts val="0"/>
-              </a:spcBef>
-              <a:spcAft>
-                <a:spcPts val="0"/>
-              </a:spcAft>
-              <a:buNone/>
-            </a:pPr>
-            <a:endParaRPr>
-              <a:solidFill>
-                <a:schemeClr val="lt1"/>
-              </a:solidFill>
-            </a:endParaRPr>
-          </a:p>
-        </p:txBody>
-      </p:sp>
-      <p:sp>
-        <p:nvSpPr>
-          <p:cNvPr id="109" name="Google Shape;109;p16"/>
-          <p:cNvSpPr/>
-          <p:nvPr/>
-        </p:nvSpPr>
-        <p:spPr>
-          <a:xfrm>
-            <a:off x="3848400" y="2124825"/>
-            <a:ext cx="1437600" cy="1136100"/>
-          </a:xfrm>
-          <a:prstGeom prst="chevron">
-            <a:avLst>
-              <a:gd name="adj" fmla="val 50000"/>
-            </a:avLst>
-          </a:prstGeom>
-          <a:solidFill>
-            <a:schemeClr val="dk1"/>
-          </a:solidFill>
-          <a:ln>
-            <a:noFill/>
-          </a:ln>
-        </p:spPr>
-        <p:txBody>
-          <a:bodyPr spcFirstLastPara="1" wrap="square" lIns="121875" tIns="121875" rIns="121875" bIns="121875" anchor="ctr" anchorCtr="0">
-            <a:noAutofit/>
-          </a:bodyPr>
-          <a:lstStyle/>
-          <a:p>
-            <a:pPr marL="0" lvl="0" indent="0" algn="l" rtl="0">
-              <a:spcBef>
-                <a:spcPts val="0"/>
-              </a:spcBef>
-              <a:spcAft>
-                <a:spcPts val="0"/>
-              </a:spcAft>
-              <a:buNone/>
-            </a:pPr>
-            <a:endParaRPr/>
-          </a:p>
-        </p:txBody>
-      </p:sp>
-      <p:sp>
-        <p:nvSpPr>
-          <p:cNvPr id="110" name="Google Shape;110;p16"/>
-          <p:cNvSpPr txBox="1">
-            <a:spLocks noGrp="1"/>
-          </p:cNvSpPr>
-          <p:nvPr>
-            <p:ph type="body" idx="4294967295"/>
-          </p:nvPr>
-        </p:nvSpPr>
-        <p:spPr>
-          <a:xfrm>
-            <a:off x="4083812" y="2399074"/>
-            <a:ext cx="1175400" cy="587700"/>
-          </a:xfrm>
-          <a:prstGeom prst="rect">
-            <a:avLst/>
-          </a:prstGeom>
-        </p:spPr>
-        <p:txBody>
-          <a:bodyPr spcFirstLastPara="1" wrap="square" lIns="91425" tIns="91425" rIns="91425" bIns="91425" anchor="ctr" anchorCtr="0">
-            <a:noAutofit/>
-          </a:bodyPr>
-          <a:lstStyle/>
-          <a:p>
-            <a:pPr marL="0" lvl="0" indent="0" algn="l" rtl="0">
-              <a:lnSpc>
-                <a:spcPct val="100000"/>
-              </a:lnSpc>
-              <a:spcBef>
-                <a:spcPts val="0"/>
-              </a:spcBef>
-              <a:spcAft>
-                <a:spcPts val="0"/>
-              </a:spcAft>
-              <a:buNone/>
-            </a:pPr>
-            <a:endParaRPr>
-              <a:solidFill>
-                <a:schemeClr val="lt1"/>
-              </a:solidFill>
-            </a:endParaRPr>
-          </a:p>
-        </p:txBody>
-      </p:sp>
-      <p:sp>
-        <p:nvSpPr>
-          <p:cNvPr id="111" name="Google Shape;111;p16"/>
-          <p:cNvSpPr/>
-          <p:nvPr/>
-        </p:nvSpPr>
-        <p:spPr>
-          <a:xfrm>
-            <a:off x="5494638" y="2124825"/>
-            <a:ext cx="1437600" cy="1136100"/>
-          </a:xfrm>
-          <a:prstGeom prst="chevron">
-            <a:avLst>
-              <a:gd name="adj" fmla="val 50000"/>
-            </a:avLst>
-          </a:prstGeom>
-          <a:solidFill>
-            <a:schemeClr val="dk1"/>
-          </a:solidFill>
-          <a:ln>
-            <a:noFill/>
-          </a:ln>
-        </p:spPr>
-        <p:txBody>
-          <a:bodyPr spcFirstLastPara="1" wrap="square" lIns="121875" tIns="121875" rIns="121875" bIns="121875" anchor="ctr" anchorCtr="0">
-            <a:noAutofit/>
-          </a:bodyPr>
-          <a:lstStyle/>
-          <a:p>
-            <a:pPr marL="0" lvl="0" indent="0" algn="l" rtl="0">
-              <a:spcBef>
-                <a:spcPts val="0"/>
-              </a:spcBef>
-              <a:spcAft>
-                <a:spcPts val="0"/>
-              </a:spcAft>
-              <a:buNone/>
-            </a:pPr>
-            <a:endParaRPr/>
-          </a:p>
-        </p:txBody>
-      </p:sp>
-      <p:sp>
-        <p:nvSpPr>
-          <p:cNvPr id="112" name="Google Shape;112;p16"/>
-          <p:cNvSpPr txBox="1">
-            <a:spLocks noGrp="1"/>
-          </p:cNvSpPr>
-          <p:nvPr>
-            <p:ph type="body" idx="4294967295"/>
-          </p:nvPr>
-        </p:nvSpPr>
-        <p:spPr>
-          <a:xfrm>
-            <a:off x="5730049" y="2399074"/>
-            <a:ext cx="1175400" cy="587700"/>
-          </a:xfrm>
-          <a:prstGeom prst="rect">
-            <a:avLst/>
-          </a:prstGeom>
-        </p:spPr>
-        <p:txBody>
-          <a:bodyPr spcFirstLastPara="1" wrap="square" lIns="91425" tIns="91425" rIns="91425" bIns="91425" anchor="ctr" anchorCtr="0">
-            <a:noAutofit/>
-          </a:bodyPr>
-          <a:lstStyle/>
-          <a:p>
-            <a:pPr marL="0" lvl="0" indent="0" algn="l" rtl="0">
-              <a:lnSpc>
-                <a:spcPct val="100000"/>
-              </a:lnSpc>
-              <a:spcBef>
-                <a:spcPts val="0"/>
-              </a:spcBef>
-              <a:spcAft>
-                <a:spcPts val="0"/>
-              </a:spcAft>
-              <a:buNone/>
-            </a:pPr>
-            <a:endParaRPr>
-              <a:solidFill>
-                <a:schemeClr val="lt1"/>
-              </a:solidFill>
-            </a:endParaRPr>
-          </a:p>
-        </p:txBody>
-      </p:sp>
-      <p:sp>
-        <p:nvSpPr>
-          <p:cNvPr id="113" name="Google Shape;113;p16"/>
-          <p:cNvSpPr/>
-          <p:nvPr/>
-        </p:nvSpPr>
-        <p:spPr>
-          <a:xfrm>
-            <a:off x="7167675" y="2124825"/>
-            <a:ext cx="1437600" cy="1136100"/>
-          </a:xfrm>
-          <a:prstGeom prst="chevron">
-            <a:avLst>
-              <a:gd name="adj" fmla="val 50000"/>
-            </a:avLst>
-          </a:prstGeom>
-          <a:solidFill>
-            <a:schemeClr val="dk1"/>
-          </a:solidFill>
-          <a:ln>
-            <a:noFill/>
-          </a:ln>
-        </p:spPr>
-        <p:txBody>
-          <a:bodyPr spcFirstLastPara="1" wrap="square" lIns="121875" tIns="121875" rIns="121875" bIns="121875" anchor="ctr" anchorCtr="0">
-            <a:noAutofit/>
-          </a:bodyPr>
-          <a:lstStyle/>
-          <a:p>
-            <a:pPr marL="0" lvl="0" indent="0" algn="l" rtl="0">
-              <a:spcBef>
-                <a:spcPts val="0"/>
-              </a:spcBef>
-              <a:spcAft>
-                <a:spcPts val="0"/>
-              </a:spcAft>
-              <a:buNone/>
-            </a:pPr>
-            <a:endParaRPr/>
-          </a:p>
-        </p:txBody>
-      </p:sp>
-      <p:sp>
-        <p:nvSpPr>
-          <p:cNvPr id="114" name="Google Shape;114;p16"/>
-          <p:cNvSpPr txBox="1">
-            <a:spLocks noGrp="1"/>
-          </p:cNvSpPr>
-          <p:nvPr>
-            <p:ph type="body" idx="4294967295"/>
-          </p:nvPr>
-        </p:nvSpPr>
-        <p:spPr>
-          <a:xfrm>
-            <a:off x="7403087" y="2399074"/>
-            <a:ext cx="1175400" cy="587700"/>
-          </a:xfrm>
-          <a:prstGeom prst="rect">
-            <a:avLst/>
-          </a:prstGeom>
-        </p:spPr>
-        <p:txBody>
-          <a:bodyPr spcFirstLastPara="1" wrap="square" lIns="91425" tIns="91425" rIns="91425" bIns="91425" anchor="ctr" anchorCtr="0">
-            <a:noAutofit/>
-          </a:bodyPr>
-          <a:lstStyle/>
-          <a:p>
-            <a:pPr marL="0" lvl="0" indent="0" algn="l" rtl="0">
-              <a:lnSpc>
-                <a:spcPct val="100000"/>
-              </a:lnSpc>
-              <a:spcBef>
-                <a:spcPts val="0"/>
-              </a:spcBef>
-              <a:spcAft>
-                <a:spcPts val="0"/>
-              </a:spcAft>
-              <a:buNone/>
-            </a:pPr>
-            <a:endParaRPr>
-              <a:solidFill>
-                <a:schemeClr val="lt1"/>
-              </a:solidFill>
-            </a:endParaRPr>
-          </a:p>
-        </p:txBody>
-      </p:sp>
-    </p:spTree>
-  </p:cSld>
-  <p:clrMapOvr>
-    <a:masterClrMapping/>
-  </p:clrMapOvr>
-</p:sld>
-</file>
-
-<file path=ppt/slides/slide5.xml><?xml version="1.0" encoding="utf-8"?>
-<p:sld xmlns:a="http://schemas.openxmlformats.org/drawingml/2006/main" xmlns:r="http://schemas.openxmlformats.org/officeDocument/2006/relationships" xmlns:p="http://schemas.openxmlformats.org/presentationml/2006/main">
-  <p:cSld>
-    <p:spTree>
-      <p:nvGrpSpPr>
         <p:cNvPr id="1" name="Shape 118"/>
         <p:cNvGrpSpPr/>
         <p:nvPr/>
@@ -12618,7 +11195,7 @@
 </p:sld>
 </file>
 
-<file path=ppt/slides/slide6.xml><?xml version="1.0" encoding="utf-8"?>
+<file path=ppt/slides/slide5.xml><?xml version="1.0" encoding="utf-8"?>
 <p:sld xmlns:a="http://schemas.openxmlformats.org/drawingml/2006/main" xmlns:r="http://schemas.openxmlformats.org/officeDocument/2006/relationships" xmlns:p="http://schemas.openxmlformats.org/presentationml/2006/main">
   <p:cSld>
     <p:spTree>
@@ -13708,7 +12285,7 @@
 </p:sld>
 </file>
 
-<file path=ppt/slides/slide7.xml><?xml version="1.0" encoding="utf-8"?>
+<file path=ppt/slides/slide6.xml><?xml version="1.0" encoding="utf-8"?>
 <p:sld xmlns:a="http://schemas.openxmlformats.org/drawingml/2006/main" xmlns:r="http://schemas.openxmlformats.org/officeDocument/2006/relationships" xmlns:p="http://schemas.openxmlformats.org/presentationml/2006/main">
   <p:cSld>
     <p:spTree>
@@ -14180,7 +12757,7 @@
 </p:sld>
 </file>
 
-<file path=ppt/slides/slide8.xml><?xml version="1.0" encoding="utf-8"?>
+<file path=ppt/slides/slide7.xml><?xml version="1.0" encoding="utf-8"?>
 <p:sld xmlns:a="http://schemas.openxmlformats.org/drawingml/2006/main" xmlns:r="http://schemas.openxmlformats.org/officeDocument/2006/relationships" xmlns:p="http://schemas.openxmlformats.org/presentationml/2006/main">
   <p:cSld>
     <p:spTree>
@@ -14409,7 +12986,7 @@
 </p:sld>
 </file>
 
-<file path=ppt/slides/slide9.xml><?xml version="1.0" encoding="utf-8"?>
+<file path=ppt/slides/slide8.xml><?xml version="1.0" encoding="utf-8"?>
 <p:sld xmlns:a="http://schemas.openxmlformats.org/drawingml/2006/main" xmlns:r="http://schemas.openxmlformats.org/officeDocument/2006/relationships" xmlns:p="http://schemas.openxmlformats.org/presentationml/2006/main">
   <p:cSld>
     <p:spTree>
@@ -14468,6 +13045,822 @@
           </a:p>
         </p:txBody>
       </p:sp>
+    </p:spTree>
+  </p:cSld>
+  <p:clrMapOvr>
+    <a:masterClrMapping/>
+  </p:clrMapOvr>
+</p:sld>
+</file>
+
+<file path=ppt/slides/slide9.xml><?xml version="1.0" encoding="utf-8"?>
+<p:sld xmlns:a="http://schemas.openxmlformats.org/drawingml/2006/main" xmlns:r="http://schemas.openxmlformats.org/officeDocument/2006/relationships" xmlns:p="http://schemas.openxmlformats.org/presentationml/2006/main">
+  <p:cSld>
+    <p:spTree>
+      <p:nvGrpSpPr>
+        <p:cNvPr id="1" name="Shape 162"/>
+        <p:cNvGrpSpPr/>
+        <p:nvPr/>
+      </p:nvGrpSpPr>
+      <p:grpSpPr>
+        <a:xfrm>
+          <a:off x="0" y="0"/>
+          <a:ext cx="0" cy="0"/>
+          <a:chOff x="0" y="0"/>
+          <a:chExt cx="0" cy="0"/>
+        </a:xfrm>
+      </p:grpSpPr>
+      <p:sp>
+        <p:nvSpPr>
+          <p:cNvPr id="163" name="Google Shape;163;p22"/>
+          <p:cNvSpPr txBox="1">
+            <a:spLocks noGrp="1"/>
+          </p:cNvSpPr>
+          <p:nvPr>
+            <p:ph type="title"/>
+          </p:nvPr>
+        </p:nvSpPr>
+        <p:spPr>
+          <a:xfrm>
+            <a:off x="311700" y="410000"/>
+            <a:ext cx="8520600" cy="607800"/>
+          </a:xfrm>
+          <a:prstGeom prst="rect">
+            <a:avLst/>
+          </a:prstGeom>
+        </p:spPr>
+        <p:txBody>
+          <a:bodyPr spcFirstLastPara="1" wrap="square" lIns="91425" tIns="91425" rIns="91425" bIns="91425" anchor="t" anchorCtr="0">
+            <a:noAutofit/>
+          </a:bodyPr>
+          <a:lstStyle/>
+          <a:p>
+            <a:pPr marL="0" lvl="0" indent="0" algn="l" rtl="0">
+              <a:spcBef>
+                <a:spcPts val="0"/>
+              </a:spcBef>
+              <a:spcAft>
+                <a:spcPts val="0"/>
+              </a:spcAft>
+              <a:buNone/>
+            </a:pPr>
+            <a:r>
+              <a:rPr lang="it"/>
+              <a:t>ZED cam</a:t>
+            </a:r>
+            <a:endParaRPr/>
+          </a:p>
+        </p:txBody>
+      </p:sp>
+      <p:pic>
+        <p:nvPicPr>
+          <p:cNvPr id="164" name="Google Shape;164;p22"/>
+          <p:cNvPicPr preferRelativeResize="0"/>
+          <p:nvPr/>
+        </p:nvPicPr>
+        <p:blipFill>
+          <a:blip r:embed="rId3">
+            <a:alphaModFix/>
+          </a:blip>
+          <a:stretch>
+            <a:fillRect/>
+          </a:stretch>
+        </p:blipFill>
+        <p:spPr>
+          <a:xfrm>
+            <a:off x="5860975" y="165362"/>
+            <a:ext cx="3283026" cy="1155625"/>
+          </a:xfrm>
+          <a:prstGeom prst="rect">
+            <a:avLst/>
+          </a:prstGeom>
+          <a:noFill/>
+          <a:ln>
+            <a:noFill/>
+          </a:ln>
+        </p:spPr>
+      </p:pic>
+      <p:pic>
+        <p:nvPicPr>
+          <p:cNvPr id="165" name="Google Shape;165;p22"/>
+          <p:cNvPicPr preferRelativeResize="0"/>
+          <p:nvPr/>
+        </p:nvPicPr>
+        <p:blipFill>
+          <a:blip r:embed="rId4">
+            <a:alphaModFix/>
+          </a:blip>
+          <a:stretch>
+            <a:fillRect/>
+          </a:stretch>
+        </p:blipFill>
+        <p:spPr>
+          <a:xfrm>
+            <a:off x="5860975" y="1321000"/>
+            <a:ext cx="3283024" cy="2038420"/>
+          </a:xfrm>
+          <a:prstGeom prst="rect">
+            <a:avLst/>
+          </a:prstGeom>
+          <a:noFill/>
+          <a:ln>
+            <a:noFill/>
+          </a:ln>
+        </p:spPr>
+      </p:pic>
+      <p:sp>
+        <p:nvSpPr>
+          <p:cNvPr id="166" name="Google Shape;166;p22"/>
+          <p:cNvSpPr txBox="1"/>
+          <p:nvPr/>
+        </p:nvSpPr>
+        <p:spPr>
+          <a:xfrm>
+            <a:off x="311700" y="1249575"/>
+            <a:ext cx="5837700" cy="1046700"/>
+          </a:xfrm>
+          <a:prstGeom prst="rect">
+            <a:avLst/>
+          </a:prstGeom>
+          <a:noFill/>
+          <a:ln>
+            <a:noFill/>
+          </a:ln>
+        </p:spPr>
+        <p:txBody>
+          <a:bodyPr spcFirstLastPara="1" wrap="square" lIns="91425" tIns="91425" rIns="91425" bIns="91425" anchor="t" anchorCtr="0">
+            <a:spAutoFit/>
+          </a:bodyPr>
+          <a:lstStyle/>
+          <a:p>
+            <a:pPr marL="457200" lvl="0" indent="-317500" algn="l" rtl="0">
+              <a:spcBef>
+                <a:spcPts val="0"/>
+              </a:spcBef>
+              <a:spcAft>
+                <a:spcPts val="0"/>
+              </a:spcAft>
+              <a:buSzPts val="1400"/>
+              <a:buFont typeface="Roboto"/>
+              <a:buChar char="●"/>
+            </a:pPr>
+            <a:r>
+              <a:rPr lang="it">
+                <a:latin typeface="Roboto"/>
+                <a:ea typeface="Roboto"/>
+                <a:cs typeface="Roboto"/>
+                <a:sym typeface="Roboto"/>
+              </a:rPr>
+              <a:t>Neural depth sensing</a:t>
+            </a:r>
+            <a:endParaRPr>
+              <a:latin typeface="Roboto"/>
+              <a:ea typeface="Roboto"/>
+              <a:cs typeface="Roboto"/>
+              <a:sym typeface="Roboto"/>
+            </a:endParaRPr>
+          </a:p>
+          <a:p>
+            <a:pPr marL="457200" lvl="0" indent="-317500" algn="l" rtl="0">
+              <a:spcBef>
+                <a:spcPts val="0"/>
+              </a:spcBef>
+              <a:spcAft>
+                <a:spcPts val="0"/>
+              </a:spcAft>
+              <a:buSzPts val="1400"/>
+              <a:buFont typeface="Roboto"/>
+              <a:buChar char="●"/>
+            </a:pPr>
+            <a:r>
+              <a:rPr lang="it">
+                <a:latin typeface="Roboto"/>
+                <a:ea typeface="Roboto"/>
+                <a:cs typeface="Roboto"/>
+                <a:sym typeface="Roboto"/>
+              </a:rPr>
+              <a:t>Ultrawide field of view with low distortions</a:t>
+            </a:r>
+            <a:endParaRPr>
+              <a:latin typeface="Roboto"/>
+              <a:ea typeface="Roboto"/>
+              <a:cs typeface="Roboto"/>
+              <a:sym typeface="Roboto"/>
+            </a:endParaRPr>
+          </a:p>
+          <a:p>
+            <a:pPr marL="457200" lvl="0" indent="-317500" algn="l" rtl="0">
+              <a:spcBef>
+                <a:spcPts val="0"/>
+              </a:spcBef>
+              <a:spcAft>
+                <a:spcPts val="0"/>
+              </a:spcAft>
+              <a:buSzPts val="1400"/>
+              <a:buFont typeface="Roboto"/>
+              <a:buChar char="●"/>
+            </a:pPr>
+            <a:r>
+              <a:rPr lang="it">
+                <a:latin typeface="Roboto"/>
+                <a:ea typeface="Roboto"/>
+                <a:cs typeface="Roboto"/>
+                <a:sym typeface="Roboto"/>
+              </a:rPr>
+              <a:t>Complete sensor stack</a:t>
+            </a:r>
+            <a:endParaRPr>
+              <a:latin typeface="Roboto"/>
+              <a:ea typeface="Roboto"/>
+              <a:cs typeface="Roboto"/>
+              <a:sym typeface="Roboto"/>
+            </a:endParaRPr>
+          </a:p>
+          <a:p>
+            <a:pPr marL="457200" lvl="0" indent="-317500" algn="l" rtl="0">
+              <a:spcBef>
+                <a:spcPts val="0"/>
+              </a:spcBef>
+              <a:spcAft>
+                <a:spcPts val="0"/>
+              </a:spcAft>
+              <a:buSzPts val="1400"/>
+              <a:buFont typeface="Roboto"/>
+              <a:buChar char="●"/>
+            </a:pPr>
+            <a:r>
+              <a:rPr lang="it">
+                <a:latin typeface="Roboto"/>
+                <a:ea typeface="Roboto"/>
+                <a:cs typeface="Roboto"/>
+                <a:sym typeface="Roboto"/>
+              </a:rPr>
+              <a:t>Thermal control</a:t>
+            </a:r>
+            <a:endParaRPr>
+              <a:latin typeface="Roboto"/>
+              <a:ea typeface="Roboto"/>
+              <a:cs typeface="Roboto"/>
+              <a:sym typeface="Roboto"/>
+            </a:endParaRPr>
+          </a:p>
+        </p:txBody>
+      </p:sp>
+      <p:grpSp>
+        <p:nvGrpSpPr>
+          <p:cNvPr id="167" name="Google Shape;167;p22"/>
+          <p:cNvGrpSpPr/>
+          <p:nvPr/>
+        </p:nvGrpSpPr>
+        <p:grpSpPr>
+          <a:xfrm>
+            <a:off x="152411" y="2372475"/>
+            <a:ext cx="2547000" cy="2547000"/>
+            <a:chOff x="1293736" y="1258050"/>
+            <a:chExt cx="2547000" cy="2547000"/>
+          </a:xfrm>
+        </p:grpSpPr>
+        <p:sp>
+          <p:nvSpPr>
+            <p:cNvPr id="168" name="Google Shape;168;p22"/>
+            <p:cNvSpPr/>
+            <p:nvPr/>
+          </p:nvSpPr>
+          <p:spPr>
+            <a:xfrm rot="2700000">
+              <a:off x="2286374" y="1011412"/>
+              <a:ext cx="561726" cy="3040276"/>
+            </a:xfrm>
+            <a:prstGeom prst="roundRect">
+              <a:avLst>
+                <a:gd name="adj" fmla="val 50000"/>
+              </a:avLst>
+            </a:prstGeom>
+            <a:solidFill>
+              <a:srgbClr val="0944A1"/>
+            </a:solidFill>
+            <a:ln>
+              <a:noFill/>
+            </a:ln>
+          </p:spPr>
+          <p:txBody>
+            <a:bodyPr spcFirstLastPara="1" wrap="square" lIns="91425" tIns="91425" rIns="91425" bIns="91425" anchor="ctr" anchorCtr="0">
+              <a:noAutofit/>
+            </a:bodyPr>
+            <a:lstStyle/>
+            <a:p>
+              <a:pPr marL="0" lvl="0" indent="0" algn="l" rtl="0">
+                <a:spcBef>
+                  <a:spcPts val="0"/>
+                </a:spcBef>
+                <a:spcAft>
+                  <a:spcPts val="0"/>
+                </a:spcAft>
+                <a:buNone/>
+              </a:pPr>
+              <a:endParaRPr/>
+            </a:p>
+          </p:txBody>
+        </p:sp>
+        <p:sp>
+          <p:nvSpPr>
+            <p:cNvPr id="169" name="Google Shape;169;p22"/>
+            <p:cNvSpPr/>
+            <p:nvPr/>
+          </p:nvSpPr>
+          <p:spPr>
+            <a:xfrm>
+              <a:off x="1510752" y="3205393"/>
+              <a:ext cx="374100" cy="374100"/>
+            </a:xfrm>
+            <a:prstGeom prst="ellipse">
+              <a:avLst/>
+            </a:prstGeom>
+            <a:solidFill>
+              <a:srgbClr val="FFFFFF"/>
+            </a:solidFill>
+            <a:ln>
+              <a:noFill/>
+            </a:ln>
+            <a:effectLst>
+              <a:outerShdw blurRad="228600" dist="50800" dir="5400000" algn="tl" rotWithShape="0">
+                <a:srgbClr val="000000">
+                  <a:alpha val="54900"/>
+                </a:srgbClr>
+              </a:outerShdw>
+            </a:effectLst>
+          </p:spPr>
+          <p:txBody>
+            <a:bodyPr spcFirstLastPara="1" wrap="square" lIns="91425" tIns="91425" rIns="91425" bIns="91425" anchor="ctr" anchorCtr="0">
+              <a:noAutofit/>
+            </a:bodyPr>
+            <a:lstStyle/>
+            <a:p>
+              <a:pPr marL="0" lvl="0" indent="0" algn="ctr" rtl="0">
+                <a:spcBef>
+                  <a:spcPts val="0"/>
+                </a:spcBef>
+                <a:spcAft>
+                  <a:spcPts val="0"/>
+                </a:spcAft>
+                <a:buNone/>
+              </a:pPr>
+              <a:r>
+                <a:rPr lang="it" sz="1200" b="1">
+                  <a:solidFill>
+                    <a:srgbClr val="0944A1"/>
+                  </a:solidFill>
+                  <a:latin typeface="Roboto"/>
+                  <a:ea typeface="Roboto"/>
+                  <a:cs typeface="Roboto"/>
+                  <a:sym typeface="Roboto"/>
+                </a:rPr>
+                <a:t>1</a:t>
+              </a:r>
+              <a:endParaRPr sz="1200" b="1">
+                <a:solidFill>
+                  <a:srgbClr val="0944A1"/>
+                </a:solidFill>
+                <a:latin typeface="Roboto"/>
+                <a:ea typeface="Roboto"/>
+                <a:cs typeface="Roboto"/>
+                <a:sym typeface="Roboto"/>
+              </a:endParaRPr>
+            </a:p>
+          </p:txBody>
+        </p:sp>
+        <p:sp>
+          <p:nvSpPr>
+            <p:cNvPr id="170" name="Google Shape;170;p22"/>
+            <p:cNvSpPr txBox="1"/>
+            <p:nvPr/>
+          </p:nvSpPr>
+          <p:spPr>
+            <a:xfrm rot="-2700000">
+              <a:off x="1501398" y="2241353"/>
+              <a:ext cx="2332604" cy="393293"/>
+            </a:xfrm>
+            <a:prstGeom prst="rect">
+              <a:avLst/>
+            </a:prstGeom>
+            <a:noFill/>
+            <a:ln>
+              <a:noFill/>
+            </a:ln>
+          </p:spPr>
+          <p:txBody>
+            <a:bodyPr spcFirstLastPara="1" wrap="square" lIns="91425" tIns="91425" rIns="91425" bIns="91425" anchor="ctr" anchorCtr="0">
+              <a:noAutofit/>
+            </a:bodyPr>
+            <a:lstStyle/>
+            <a:p>
+              <a:pPr marL="0" lvl="0" indent="0" algn="l" rtl="0">
+                <a:lnSpc>
+                  <a:spcPct val="115000"/>
+                </a:lnSpc>
+                <a:spcBef>
+                  <a:spcPts val="0"/>
+                </a:spcBef>
+                <a:spcAft>
+                  <a:spcPts val="0"/>
+                </a:spcAft>
+                <a:buNone/>
+              </a:pPr>
+              <a:r>
+                <a:rPr lang="it" sz="1200" b="1">
+                  <a:solidFill>
+                    <a:srgbClr val="FFFFFF"/>
+                  </a:solidFill>
+                  <a:latin typeface="Roboto"/>
+                  <a:ea typeface="Roboto"/>
+                  <a:cs typeface="Roboto"/>
+                  <a:sym typeface="Roboto"/>
+                </a:rPr>
+                <a:t>Simultaneos localization and mapping</a:t>
+              </a:r>
+              <a:endParaRPr sz="800" b="1">
+                <a:solidFill>
+                  <a:srgbClr val="FFFFFF"/>
+                </a:solidFill>
+                <a:latin typeface="Roboto"/>
+                <a:ea typeface="Roboto"/>
+                <a:cs typeface="Roboto"/>
+                <a:sym typeface="Roboto"/>
+              </a:endParaRPr>
+            </a:p>
+          </p:txBody>
+        </p:sp>
+      </p:grpSp>
+      <p:grpSp>
+        <p:nvGrpSpPr>
+          <p:cNvPr id="171" name="Google Shape;171;p22"/>
+          <p:cNvGrpSpPr/>
+          <p:nvPr/>
+        </p:nvGrpSpPr>
+        <p:grpSpPr>
+          <a:xfrm>
+            <a:off x="1605458" y="2356325"/>
+            <a:ext cx="2547000" cy="2547000"/>
+            <a:chOff x="3203958" y="1258050"/>
+            <a:chExt cx="2547000" cy="2547000"/>
+          </a:xfrm>
+        </p:grpSpPr>
+        <p:sp>
+          <p:nvSpPr>
+            <p:cNvPr id="172" name="Google Shape;172;p22"/>
+            <p:cNvSpPr/>
+            <p:nvPr/>
+          </p:nvSpPr>
+          <p:spPr>
+            <a:xfrm rot="2700000">
+              <a:off x="4196595" y="1011412"/>
+              <a:ext cx="561726" cy="3040276"/>
+            </a:xfrm>
+            <a:prstGeom prst="roundRect">
+              <a:avLst>
+                <a:gd name="adj" fmla="val 50000"/>
+              </a:avLst>
+            </a:prstGeom>
+            <a:solidFill>
+              <a:srgbClr val="0D5DDF"/>
+            </a:solidFill>
+            <a:ln>
+              <a:noFill/>
+            </a:ln>
+          </p:spPr>
+          <p:txBody>
+            <a:bodyPr spcFirstLastPara="1" wrap="square" lIns="91425" tIns="91425" rIns="91425" bIns="91425" anchor="ctr" anchorCtr="0">
+              <a:noAutofit/>
+            </a:bodyPr>
+            <a:lstStyle/>
+            <a:p>
+              <a:pPr marL="0" lvl="0" indent="0" algn="l" rtl="0">
+                <a:spcBef>
+                  <a:spcPts val="0"/>
+                </a:spcBef>
+                <a:spcAft>
+                  <a:spcPts val="0"/>
+                </a:spcAft>
+                <a:buNone/>
+              </a:pPr>
+              <a:endParaRPr/>
+            </a:p>
+          </p:txBody>
+        </p:sp>
+        <p:sp>
+          <p:nvSpPr>
+            <p:cNvPr id="173" name="Google Shape;173;p22"/>
+            <p:cNvSpPr/>
+            <p:nvPr/>
+          </p:nvSpPr>
+          <p:spPr>
+            <a:xfrm>
+              <a:off x="3420974" y="3205393"/>
+              <a:ext cx="374100" cy="374100"/>
+            </a:xfrm>
+            <a:prstGeom prst="ellipse">
+              <a:avLst/>
+            </a:prstGeom>
+            <a:solidFill>
+              <a:srgbClr val="FFFFFF"/>
+            </a:solidFill>
+            <a:ln>
+              <a:noFill/>
+            </a:ln>
+            <a:effectLst>
+              <a:outerShdw blurRad="228600" dist="50800" dir="5400000" algn="tl" rotWithShape="0">
+                <a:srgbClr val="000000">
+                  <a:alpha val="54900"/>
+                </a:srgbClr>
+              </a:outerShdw>
+            </a:effectLst>
+          </p:spPr>
+          <p:txBody>
+            <a:bodyPr spcFirstLastPara="1" wrap="square" lIns="91425" tIns="91425" rIns="91425" bIns="91425" anchor="ctr" anchorCtr="0">
+              <a:noAutofit/>
+            </a:bodyPr>
+            <a:lstStyle/>
+            <a:p>
+              <a:pPr marL="0" lvl="0" indent="0" algn="ctr" rtl="0">
+                <a:spcBef>
+                  <a:spcPts val="0"/>
+                </a:spcBef>
+                <a:spcAft>
+                  <a:spcPts val="0"/>
+                </a:spcAft>
+                <a:buNone/>
+              </a:pPr>
+              <a:r>
+                <a:rPr lang="it" sz="1200" b="1">
+                  <a:solidFill>
+                    <a:srgbClr val="0D5DDF"/>
+                  </a:solidFill>
+                  <a:latin typeface="Roboto"/>
+                  <a:ea typeface="Roboto"/>
+                  <a:cs typeface="Roboto"/>
+                  <a:sym typeface="Roboto"/>
+                </a:rPr>
+                <a:t>2</a:t>
+              </a:r>
+              <a:endParaRPr sz="1200" b="1">
+                <a:solidFill>
+                  <a:srgbClr val="0D5DDF"/>
+                </a:solidFill>
+                <a:latin typeface="Roboto"/>
+                <a:ea typeface="Roboto"/>
+                <a:cs typeface="Roboto"/>
+                <a:sym typeface="Roboto"/>
+              </a:endParaRPr>
+            </a:p>
+          </p:txBody>
+        </p:sp>
+        <p:sp>
+          <p:nvSpPr>
+            <p:cNvPr id="174" name="Google Shape;174;p22"/>
+            <p:cNvSpPr txBox="1"/>
+            <p:nvPr/>
+          </p:nvSpPr>
+          <p:spPr>
+            <a:xfrm rot="-2700000">
+              <a:off x="3410687" y="2240903"/>
+              <a:ext cx="2333877" cy="393293"/>
+            </a:xfrm>
+            <a:prstGeom prst="rect">
+              <a:avLst/>
+            </a:prstGeom>
+            <a:noFill/>
+            <a:ln>
+              <a:noFill/>
+            </a:ln>
+          </p:spPr>
+          <p:txBody>
+            <a:bodyPr spcFirstLastPara="1" wrap="square" lIns="91425" tIns="91425" rIns="91425" bIns="91425" anchor="ctr" anchorCtr="0">
+              <a:noAutofit/>
+            </a:bodyPr>
+            <a:lstStyle/>
+            <a:p>
+              <a:pPr marL="0" lvl="0" indent="0" algn="l" rtl="0">
+                <a:lnSpc>
+                  <a:spcPct val="115000"/>
+                </a:lnSpc>
+                <a:spcBef>
+                  <a:spcPts val="0"/>
+                </a:spcBef>
+                <a:spcAft>
+                  <a:spcPts val="0"/>
+                </a:spcAft>
+                <a:buNone/>
+              </a:pPr>
+              <a:r>
+                <a:rPr lang="it" sz="1200" b="1">
+                  <a:solidFill>
+                    <a:srgbClr val="FFFFFF"/>
+                  </a:solidFill>
+                  <a:latin typeface="Roboto"/>
+                  <a:ea typeface="Roboto"/>
+                  <a:cs typeface="Roboto"/>
+                  <a:sym typeface="Roboto"/>
+                </a:rPr>
+                <a:t>Floor plane detection</a:t>
+              </a:r>
+              <a:endParaRPr sz="800" b="1">
+                <a:solidFill>
+                  <a:srgbClr val="FFFFFF"/>
+                </a:solidFill>
+                <a:latin typeface="Roboto"/>
+                <a:ea typeface="Roboto"/>
+                <a:cs typeface="Roboto"/>
+                <a:sym typeface="Roboto"/>
+              </a:endParaRPr>
+            </a:p>
+          </p:txBody>
+        </p:sp>
+      </p:grpSp>
+      <p:grpSp>
+        <p:nvGrpSpPr>
+          <p:cNvPr id="175" name="Google Shape;175;p22"/>
+          <p:cNvGrpSpPr/>
+          <p:nvPr/>
+        </p:nvGrpSpPr>
+        <p:grpSpPr>
+          <a:xfrm>
+            <a:off x="3069002" y="2372475"/>
+            <a:ext cx="2547000" cy="2547000"/>
+            <a:chOff x="5123977" y="1258050"/>
+            <a:chExt cx="2547000" cy="2547000"/>
+          </a:xfrm>
+        </p:grpSpPr>
+        <p:sp>
+          <p:nvSpPr>
+            <p:cNvPr id="176" name="Google Shape;176;p22"/>
+            <p:cNvSpPr/>
+            <p:nvPr/>
+          </p:nvSpPr>
+          <p:spPr>
+            <a:xfrm rot="2700000">
+              <a:off x="6116614" y="1011412"/>
+              <a:ext cx="561726" cy="3040276"/>
+            </a:xfrm>
+            <a:prstGeom prst="roundRect">
+              <a:avLst>
+                <a:gd name="adj" fmla="val 50000"/>
+              </a:avLst>
+            </a:prstGeom>
+            <a:solidFill>
+              <a:srgbClr val="307BF3"/>
+            </a:solidFill>
+            <a:ln>
+              <a:noFill/>
+            </a:ln>
+          </p:spPr>
+          <p:txBody>
+            <a:bodyPr spcFirstLastPara="1" wrap="square" lIns="91425" tIns="91425" rIns="91425" bIns="91425" anchor="ctr" anchorCtr="0">
+              <a:noAutofit/>
+            </a:bodyPr>
+            <a:lstStyle/>
+            <a:p>
+              <a:pPr marL="0" lvl="0" indent="0" algn="l" rtl="0">
+                <a:spcBef>
+                  <a:spcPts val="0"/>
+                </a:spcBef>
+                <a:spcAft>
+                  <a:spcPts val="0"/>
+                </a:spcAft>
+                <a:buNone/>
+              </a:pPr>
+              <a:endParaRPr/>
+            </a:p>
+          </p:txBody>
+        </p:sp>
+        <p:sp>
+          <p:nvSpPr>
+            <p:cNvPr id="177" name="Google Shape;177;p22"/>
+            <p:cNvSpPr/>
+            <p:nvPr/>
+          </p:nvSpPr>
+          <p:spPr>
+            <a:xfrm>
+              <a:off x="5340992" y="3205393"/>
+              <a:ext cx="374100" cy="374100"/>
+            </a:xfrm>
+            <a:prstGeom prst="ellipse">
+              <a:avLst/>
+            </a:prstGeom>
+            <a:solidFill>
+              <a:srgbClr val="FFFFFF"/>
+            </a:solidFill>
+            <a:ln>
+              <a:noFill/>
+            </a:ln>
+            <a:effectLst>
+              <a:outerShdw blurRad="228600" dist="50800" dir="5400000" algn="tl" rotWithShape="0">
+                <a:srgbClr val="000000">
+                  <a:alpha val="54900"/>
+                </a:srgbClr>
+              </a:outerShdw>
+            </a:effectLst>
+          </p:spPr>
+          <p:txBody>
+            <a:bodyPr spcFirstLastPara="1" wrap="square" lIns="91425" tIns="91425" rIns="91425" bIns="91425" anchor="ctr" anchorCtr="0">
+              <a:noAutofit/>
+            </a:bodyPr>
+            <a:lstStyle/>
+            <a:p>
+              <a:pPr marL="0" lvl="0" indent="0" algn="ctr" rtl="0">
+                <a:spcBef>
+                  <a:spcPts val="0"/>
+                </a:spcBef>
+                <a:spcAft>
+                  <a:spcPts val="0"/>
+                </a:spcAft>
+                <a:buNone/>
+              </a:pPr>
+              <a:r>
+                <a:rPr lang="it" sz="1200" b="1">
+                  <a:solidFill>
+                    <a:srgbClr val="307BF3"/>
+                  </a:solidFill>
+                  <a:latin typeface="Roboto"/>
+                  <a:ea typeface="Roboto"/>
+                  <a:cs typeface="Roboto"/>
+                  <a:sym typeface="Roboto"/>
+                </a:rPr>
+                <a:t>3</a:t>
+              </a:r>
+              <a:endParaRPr sz="1200" b="1">
+                <a:solidFill>
+                  <a:srgbClr val="307BF3"/>
+                </a:solidFill>
+                <a:latin typeface="Roboto"/>
+                <a:ea typeface="Roboto"/>
+                <a:cs typeface="Roboto"/>
+                <a:sym typeface="Roboto"/>
+              </a:endParaRPr>
+            </a:p>
+          </p:txBody>
+        </p:sp>
+        <p:sp>
+          <p:nvSpPr>
+            <p:cNvPr id="178" name="Google Shape;178;p22"/>
+            <p:cNvSpPr txBox="1"/>
+            <p:nvPr/>
+          </p:nvSpPr>
+          <p:spPr>
+            <a:xfrm rot="-2700000">
+              <a:off x="5323969" y="2238203"/>
+              <a:ext cx="2341513" cy="393293"/>
+            </a:xfrm>
+            <a:prstGeom prst="rect">
+              <a:avLst/>
+            </a:prstGeom>
+            <a:noFill/>
+            <a:ln>
+              <a:noFill/>
+            </a:ln>
+          </p:spPr>
+          <p:txBody>
+            <a:bodyPr spcFirstLastPara="1" wrap="square" lIns="91425" tIns="91425" rIns="91425" bIns="91425" anchor="ctr" anchorCtr="0">
+              <a:noAutofit/>
+            </a:bodyPr>
+            <a:lstStyle/>
+            <a:p>
+              <a:pPr marL="0" lvl="0" indent="0" algn="l" rtl="0">
+                <a:lnSpc>
+                  <a:spcPct val="115000"/>
+                </a:lnSpc>
+                <a:spcBef>
+                  <a:spcPts val="0"/>
+                </a:spcBef>
+                <a:spcAft>
+                  <a:spcPts val="0"/>
+                </a:spcAft>
+                <a:buNone/>
+              </a:pPr>
+              <a:r>
+                <a:rPr lang="it" sz="1200" b="1">
+                  <a:solidFill>
+                    <a:srgbClr val="FFFFFF"/>
+                  </a:solidFill>
+                  <a:latin typeface="Roboto"/>
+                  <a:ea typeface="Roboto"/>
+                  <a:cs typeface="Roboto"/>
+                  <a:sym typeface="Roboto"/>
+                </a:rPr>
+                <a:t>Skeleton tracking</a:t>
+              </a:r>
+              <a:endParaRPr sz="800" b="1">
+                <a:solidFill>
+                  <a:srgbClr val="FFFFFF"/>
+                </a:solidFill>
+                <a:latin typeface="Roboto"/>
+                <a:ea typeface="Roboto"/>
+                <a:cs typeface="Roboto"/>
+                <a:sym typeface="Roboto"/>
+              </a:endParaRPr>
+            </a:p>
+          </p:txBody>
+        </p:sp>
+      </p:grpSp>
     </p:spTree>
   </p:cSld>
   <p:clrMapOvr>

</xml_diff>